<commit_message>
this paper needs to be done.
</commit_message>
<xml_diff>
--- a/manuscript/manuscript_figures/ASC_DES_overlapbtwtimepoints.pptx
+++ b/manuscript/manuscript_figures/ASC_DES_overlapbtwtimepoints.pptx
@@ -7,6 +7,7 @@
   <p:sldIdLst>
     <p:sldId id="256" r:id="rId2"/>
     <p:sldId id="257" r:id="rId3"/>
+    <p:sldId id="258" r:id="rId4"/>
   </p:sldIdLst>
   <p:sldSz cx="10058400" cy="10972800"/>
   <p:notesSz cx="6858000" cy="9144000"/>
@@ -118,12 +119,12 @@
   <pc:docChgLst>
     <pc:chgData name="Tyler Milewski" userId="d8a66fee8314b92f" providerId="LiveId" clId="{50E7EBB3-9316-4D0E-B7DF-278ECDC7CA52}"/>
     <pc:docChg chg="undo custSel addSld modSld">
-      <pc:chgData name="Tyler Milewski" userId="d8a66fee8314b92f" providerId="LiveId" clId="{50E7EBB3-9316-4D0E-B7DF-278ECDC7CA52}" dt="2024-01-25T16:16:23.790" v="54" actId="1076"/>
+      <pc:chgData name="Tyler Milewski" userId="d8a66fee8314b92f" providerId="LiveId" clId="{50E7EBB3-9316-4D0E-B7DF-278ECDC7CA52}" dt="2024-02-06T19:59:22.687" v="137" actId="1076"/>
       <pc:docMkLst>
         <pc:docMk/>
       </pc:docMkLst>
-      <pc:sldChg chg="modSp mod">
-        <pc:chgData name="Tyler Milewski" userId="d8a66fee8314b92f" providerId="LiveId" clId="{50E7EBB3-9316-4D0E-B7DF-278ECDC7CA52}" dt="2024-01-17T21:16:08.230" v="47" actId="20577"/>
+      <pc:sldChg chg="addSp delSp modSp mod">
+        <pc:chgData name="Tyler Milewski" userId="d8a66fee8314b92f" providerId="LiveId" clId="{50E7EBB3-9316-4D0E-B7DF-278ECDC7CA52}" dt="2024-01-28T15:44:13.450" v="70" actId="478"/>
         <pc:sldMkLst>
           <pc:docMk/>
           <pc:sldMk cId="1614882114" sldId="256"/>
@@ -160,13 +161,37 @@
             <ac:graphicFrameMk id="25" creationId="{FA5F4881-48EF-AC24-2356-C6605E8F35B2}"/>
           </ac:graphicFrameMkLst>
         </pc:graphicFrameChg>
+        <pc:picChg chg="add">
+          <ac:chgData name="Tyler Milewski" userId="d8a66fee8314b92f" providerId="LiveId" clId="{50E7EBB3-9316-4D0E-B7DF-278ECDC7CA52}" dt="2024-01-28T15:44:07.838" v="69"/>
+          <ac:picMkLst>
+            <pc:docMk/>
+            <pc:sldMk cId="1614882114" sldId="256"/>
+            <ac:picMk id="2" creationId="{6B6429D4-704B-BF44-D1BA-2CE0B118C381}"/>
+          </ac:picMkLst>
+        </pc:picChg>
+        <pc:picChg chg="add del">
+          <ac:chgData name="Tyler Milewski" userId="d8a66fee8314b92f" providerId="LiveId" clId="{50E7EBB3-9316-4D0E-B7DF-278ECDC7CA52}" dt="2024-01-28T15:44:13.450" v="70" actId="478"/>
+          <ac:picMkLst>
+            <pc:docMk/>
+            <pc:sldMk cId="1614882114" sldId="256"/>
+            <ac:picMk id="14" creationId="{2C52D048-94EB-3075-1224-3A5326391097}"/>
+          </ac:picMkLst>
+        </pc:picChg>
       </pc:sldChg>
-      <pc:sldChg chg="modSp add mod">
-        <pc:chgData name="Tyler Milewski" userId="d8a66fee8314b92f" providerId="LiveId" clId="{50E7EBB3-9316-4D0E-B7DF-278ECDC7CA52}" dt="2024-01-25T16:16:23.790" v="54" actId="1076"/>
+      <pc:sldChg chg="addSp delSp modSp add mod">
+        <pc:chgData name="Tyler Milewski" userId="d8a66fee8314b92f" providerId="LiveId" clId="{50E7EBB3-9316-4D0E-B7DF-278ECDC7CA52}" dt="2024-01-28T15:45:01.366" v="76" actId="1076"/>
         <pc:sldMkLst>
           <pc:docMk/>
           <pc:sldMk cId="2288981012" sldId="257"/>
         </pc:sldMkLst>
+        <pc:spChg chg="add">
+          <ac:chgData name="Tyler Milewski" userId="d8a66fee8314b92f" providerId="LiveId" clId="{50E7EBB3-9316-4D0E-B7DF-278ECDC7CA52}" dt="2024-01-28T15:35:02.780" v="56"/>
+          <ac:spMkLst>
+            <pc:docMk/>
+            <pc:sldMk cId="2288981012" sldId="257"/>
+            <ac:spMk id="2" creationId="{FFAF152D-0820-9D26-F584-6467D4614964}"/>
+          </ac:spMkLst>
+        </pc:spChg>
         <pc:graphicFrameChg chg="mod">
           <ac:chgData name="Tyler Milewski" userId="d8a66fee8314b92f" providerId="LiveId" clId="{50E7EBB3-9316-4D0E-B7DF-278ECDC7CA52}" dt="2024-01-25T16:15:28.063" v="51" actId="1076"/>
           <ac:graphicFrameMkLst>
@@ -199,6 +224,38 @@
             <ac:graphicFrameMk id="25" creationId="{FA5F4881-48EF-AC24-2356-C6605E8F35B2}"/>
           </ac:graphicFrameMkLst>
         </pc:graphicFrameChg>
+        <pc:picChg chg="add mod ord">
+          <ac:chgData name="Tyler Milewski" userId="d8a66fee8314b92f" providerId="LiveId" clId="{50E7EBB3-9316-4D0E-B7DF-278ECDC7CA52}" dt="2024-01-28T15:45:01.366" v="76" actId="1076"/>
+          <ac:picMkLst>
+            <pc:docMk/>
+            <pc:sldMk cId="2288981012" sldId="257"/>
+            <ac:picMk id="3" creationId="{44E09E23-9618-7D3D-2F4A-22631C2020C5}"/>
+          </ac:picMkLst>
+        </pc:picChg>
+        <pc:picChg chg="add del mod">
+          <ac:chgData name="Tyler Milewski" userId="d8a66fee8314b92f" providerId="LiveId" clId="{50E7EBB3-9316-4D0E-B7DF-278ECDC7CA52}" dt="2024-01-28T15:35:21.285" v="59" actId="478"/>
+          <ac:picMkLst>
+            <pc:docMk/>
+            <pc:sldMk cId="2288981012" sldId="257"/>
+            <ac:picMk id="3" creationId="{70189F23-8F89-13FB-8A9F-C921CD97A090}"/>
+          </ac:picMkLst>
+        </pc:picChg>
+        <pc:picChg chg="add del mod">
+          <ac:chgData name="Tyler Milewski" userId="d8a66fee8314b92f" providerId="LiveId" clId="{50E7EBB3-9316-4D0E-B7DF-278ECDC7CA52}" dt="2024-01-28T15:35:44.412" v="62" actId="478"/>
+          <ac:picMkLst>
+            <pc:docMk/>
+            <pc:sldMk cId="2288981012" sldId="257"/>
+            <ac:picMk id="5" creationId="{5AD45103-2D46-A5AD-3C32-EB4F9C2A3769}"/>
+          </ac:picMkLst>
+        </pc:picChg>
+        <pc:picChg chg="add mod ord">
+          <ac:chgData name="Tyler Milewski" userId="d8a66fee8314b92f" providerId="LiveId" clId="{50E7EBB3-9316-4D0E-B7DF-278ECDC7CA52}" dt="2024-01-28T15:36:27.539" v="67" actId="1076"/>
+          <ac:picMkLst>
+            <pc:docMk/>
+            <pc:sldMk cId="2288981012" sldId="257"/>
+            <ac:picMk id="6" creationId="{42CAAD05-09EA-0075-774C-94BC6CB39F82}"/>
+          </ac:picMkLst>
+        </pc:picChg>
         <pc:picChg chg="mod">
           <ac:chgData name="Tyler Milewski" userId="d8a66fee8314b92f" providerId="LiveId" clId="{50E7EBB3-9316-4D0E-B7DF-278ECDC7CA52}" dt="2024-01-25T16:15:07.136" v="50" actId="1076"/>
           <ac:picMkLst>
@@ -215,20 +272,107 @@
             <ac:picMk id="12" creationId="{8E8C6BC3-F32A-C381-CCE6-8BE99BD4E02F}"/>
           </ac:picMkLst>
         </pc:picChg>
-        <pc:picChg chg="mod">
-          <ac:chgData name="Tyler Milewski" userId="d8a66fee8314b92f" providerId="LiveId" clId="{50E7EBB3-9316-4D0E-B7DF-278ECDC7CA52}" dt="2024-01-25T16:16:12.458" v="53" actId="1076"/>
+        <pc:picChg chg="del mod">
+          <ac:chgData name="Tyler Milewski" userId="d8a66fee8314b92f" providerId="LiveId" clId="{50E7EBB3-9316-4D0E-B7DF-278ECDC7CA52}" dt="2024-01-28T15:44:16.213" v="71" actId="478"/>
           <ac:picMkLst>
             <pc:docMk/>
             <pc:sldMk cId="2288981012" sldId="257"/>
             <ac:picMk id="13" creationId="{04739ED9-7721-217F-0E41-A466E1AD9E0D}"/>
           </ac:picMkLst>
         </pc:picChg>
-        <pc:picChg chg="mod">
-          <ac:chgData name="Tyler Milewski" userId="d8a66fee8314b92f" providerId="LiveId" clId="{50E7EBB3-9316-4D0E-B7DF-278ECDC7CA52}" dt="2024-01-25T16:16:23.790" v="54" actId="1076"/>
+        <pc:picChg chg="del mod">
+          <ac:chgData name="Tyler Milewski" userId="d8a66fee8314b92f" providerId="LiveId" clId="{50E7EBB3-9316-4D0E-B7DF-278ECDC7CA52}" dt="2024-01-28T15:35:01.522" v="55" actId="478"/>
           <ac:picMkLst>
             <pc:docMk/>
             <pc:sldMk cId="2288981012" sldId="257"/>
             <ac:picMk id="14" creationId="{2C52D048-94EB-3075-1224-3A5326391097}"/>
+          </ac:picMkLst>
+        </pc:picChg>
+      </pc:sldChg>
+      <pc:sldChg chg="modSp add mod">
+        <pc:chgData name="Tyler Milewski" userId="d8a66fee8314b92f" providerId="LiveId" clId="{50E7EBB3-9316-4D0E-B7DF-278ECDC7CA52}" dt="2024-02-06T19:59:22.687" v="137" actId="1076"/>
+        <pc:sldMkLst>
+          <pc:docMk/>
+          <pc:sldMk cId="139090159" sldId="258"/>
+        </pc:sldMkLst>
+        <pc:spChg chg="mod">
+          <ac:chgData name="Tyler Milewski" userId="d8a66fee8314b92f" providerId="LiveId" clId="{50E7EBB3-9316-4D0E-B7DF-278ECDC7CA52}" dt="2024-02-06T19:59:22.687" v="137" actId="1076"/>
+          <ac:spMkLst>
+            <pc:docMk/>
+            <pc:sldMk cId="139090159" sldId="258"/>
+            <ac:spMk id="21" creationId="{CE276DD0-044F-1CBF-68D8-C4797059776B}"/>
+          </ac:spMkLst>
+        </pc:spChg>
+        <pc:spChg chg="mod">
+          <ac:chgData name="Tyler Milewski" userId="d8a66fee8314b92f" providerId="LiveId" clId="{50E7EBB3-9316-4D0E-B7DF-278ECDC7CA52}" dt="2024-02-06T19:59:10.178" v="136" actId="1036"/>
+          <ac:spMkLst>
+            <pc:docMk/>
+            <pc:sldMk cId="139090159" sldId="258"/>
+            <ac:spMk id="22" creationId="{16252426-79F6-5FA5-57D0-2F4685101E43}"/>
+          </ac:spMkLst>
+        </pc:spChg>
+        <pc:graphicFrameChg chg="mod">
+          <ac:chgData name="Tyler Milewski" userId="d8a66fee8314b92f" providerId="LiveId" clId="{50E7EBB3-9316-4D0E-B7DF-278ECDC7CA52}" dt="2024-02-06T19:57:05.684" v="92" actId="1076"/>
+          <ac:graphicFrameMkLst>
+            <pc:docMk/>
+            <pc:sldMk cId="139090159" sldId="258"/>
+            <ac:graphicFrameMk id="15" creationId="{500550DE-6465-2F17-318E-E1805AD784FD}"/>
+          </ac:graphicFrameMkLst>
+        </pc:graphicFrameChg>
+        <pc:graphicFrameChg chg="mod">
+          <ac:chgData name="Tyler Milewski" userId="d8a66fee8314b92f" providerId="LiveId" clId="{50E7EBB3-9316-4D0E-B7DF-278ECDC7CA52}" dt="2024-02-06T19:55:01.416" v="82" actId="1076"/>
+          <ac:graphicFrameMkLst>
+            <pc:docMk/>
+            <pc:sldMk cId="139090159" sldId="258"/>
+            <ac:graphicFrameMk id="23" creationId="{B36AB556-8C01-940A-707A-793C587E74FD}"/>
+          </ac:graphicFrameMkLst>
+        </pc:graphicFrameChg>
+        <pc:graphicFrameChg chg="mod">
+          <ac:chgData name="Tyler Milewski" userId="d8a66fee8314b92f" providerId="LiveId" clId="{50E7EBB3-9316-4D0E-B7DF-278ECDC7CA52}" dt="2024-02-06T19:56:55.018" v="91" actId="1076"/>
+          <ac:graphicFrameMkLst>
+            <pc:docMk/>
+            <pc:sldMk cId="139090159" sldId="258"/>
+            <ac:graphicFrameMk id="24" creationId="{AA9B2503-7971-4AB4-5318-2CA1498AA995}"/>
+          </ac:graphicFrameMkLst>
+        </pc:graphicFrameChg>
+        <pc:graphicFrameChg chg="mod">
+          <ac:chgData name="Tyler Milewski" userId="d8a66fee8314b92f" providerId="LiveId" clId="{50E7EBB3-9316-4D0E-B7DF-278ECDC7CA52}" dt="2024-02-06T19:54:40.606" v="80" actId="1076"/>
+          <ac:graphicFrameMkLst>
+            <pc:docMk/>
+            <pc:sldMk cId="139090159" sldId="258"/>
+            <ac:graphicFrameMk id="25" creationId="{69ACB985-C4FC-9304-D045-CB92A3771F67}"/>
+          </ac:graphicFrameMkLst>
+        </pc:graphicFrameChg>
+        <pc:picChg chg="mod">
+          <ac:chgData name="Tyler Milewski" userId="d8a66fee8314b92f" providerId="LiveId" clId="{50E7EBB3-9316-4D0E-B7DF-278ECDC7CA52}" dt="2024-02-06T19:54:55.415" v="81" actId="1076"/>
+          <ac:picMkLst>
+            <pc:docMk/>
+            <pc:sldMk cId="139090159" sldId="258"/>
+            <ac:picMk id="3" creationId="{FC1950B9-9BFC-3D44-9487-FE866C6FA93A}"/>
+          </ac:picMkLst>
+        </pc:picChg>
+        <pc:picChg chg="mod">
+          <ac:chgData name="Tyler Milewski" userId="d8a66fee8314b92f" providerId="LiveId" clId="{50E7EBB3-9316-4D0E-B7DF-278ECDC7CA52}" dt="2024-02-06T19:59:00.002" v="117" actId="1036"/>
+          <ac:picMkLst>
+            <pc:docMk/>
+            <pc:sldMk cId="139090159" sldId="258"/>
+            <ac:picMk id="6" creationId="{1F7499E9-D6FF-D079-5608-068147518B48}"/>
+          </ac:picMkLst>
+        </pc:picChg>
+        <pc:picChg chg="mod">
+          <ac:chgData name="Tyler Milewski" userId="d8a66fee8314b92f" providerId="LiveId" clId="{50E7EBB3-9316-4D0E-B7DF-278ECDC7CA52}" dt="2024-02-06T19:59:00.002" v="117" actId="1036"/>
+          <ac:picMkLst>
+            <pc:docMk/>
+            <pc:sldMk cId="139090159" sldId="258"/>
+            <ac:picMk id="11" creationId="{CD53744D-8DEA-AEB2-DA04-DC828D78F678}"/>
+          </ac:picMkLst>
+        </pc:picChg>
+        <pc:picChg chg="mod">
+          <ac:chgData name="Tyler Milewski" userId="d8a66fee8314b92f" providerId="LiveId" clId="{50E7EBB3-9316-4D0E-B7DF-278ECDC7CA52}" dt="2024-02-06T19:59:00.002" v="117" actId="1036"/>
+          <ac:picMkLst>
+            <pc:docMk/>
+            <pc:sldMk cId="139090159" sldId="258"/>
+            <ac:picMk id="12" creationId="{154C3E3F-581A-8A8B-B35F-F5B616CFC329}"/>
           </ac:picMkLst>
         </pc:picChg>
       </pc:sldChg>
@@ -368,7 +512,7 @@
           <a:p>
             <a:fld id="{EEE316C7-8034-49CB-83EB-E718F1D3B021}" type="datetimeFigureOut">
               <a:rPr lang="en-US" smtClean="0"/>
-              <a:t>1/25/2024</a:t>
+              <a:t>2/6/2024</a:t>
             </a:fld>
             <a:endParaRPr lang="en-US"/>
           </a:p>
@@ -538,7 +682,7 @@
           <a:p>
             <a:fld id="{EEE316C7-8034-49CB-83EB-E718F1D3B021}" type="datetimeFigureOut">
               <a:rPr lang="en-US" smtClean="0"/>
-              <a:t>1/25/2024</a:t>
+              <a:t>2/6/2024</a:t>
             </a:fld>
             <a:endParaRPr lang="en-US"/>
           </a:p>
@@ -718,7 +862,7 @@
           <a:p>
             <a:fld id="{EEE316C7-8034-49CB-83EB-E718F1D3B021}" type="datetimeFigureOut">
               <a:rPr lang="en-US" smtClean="0"/>
-              <a:t>1/25/2024</a:t>
+              <a:t>2/6/2024</a:t>
             </a:fld>
             <a:endParaRPr lang="en-US"/>
           </a:p>
@@ -888,7 +1032,7 @@
           <a:p>
             <a:fld id="{EEE316C7-8034-49CB-83EB-E718F1D3B021}" type="datetimeFigureOut">
               <a:rPr lang="en-US" smtClean="0"/>
-              <a:t>1/25/2024</a:t>
+              <a:t>2/6/2024</a:t>
             </a:fld>
             <a:endParaRPr lang="en-US"/>
           </a:p>
@@ -1132,7 +1276,7 @@
           <a:p>
             <a:fld id="{EEE316C7-8034-49CB-83EB-E718F1D3B021}" type="datetimeFigureOut">
               <a:rPr lang="en-US" smtClean="0"/>
-              <a:t>1/25/2024</a:t>
+              <a:t>2/6/2024</a:t>
             </a:fld>
             <a:endParaRPr lang="en-US"/>
           </a:p>
@@ -1364,7 +1508,7 @@
           <a:p>
             <a:fld id="{EEE316C7-8034-49CB-83EB-E718F1D3B021}" type="datetimeFigureOut">
               <a:rPr lang="en-US" smtClean="0"/>
-              <a:t>1/25/2024</a:t>
+              <a:t>2/6/2024</a:t>
             </a:fld>
             <a:endParaRPr lang="en-US"/>
           </a:p>
@@ -1731,7 +1875,7 @@
           <a:p>
             <a:fld id="{EEE316C7-8034-49CB-83EB-E718F1D3B021}" type="datetimeFigureOut">
               <a:rPr lang="en-US" smtClean="0"/>
-              <a:t>1/25/2024</a:t>
+              <a:t>2/6/2024</a:t>
             </a:fld>
             <a:endParaRPr lang="en-US"/>
           </a:p>
@@ -1849,7 +1993,7 @@
           <a:p>
             <a:fld id="{EEE316C7-8034-49CB-83EB-E718F1D3B021}" type="datetimeFigureOut">
               <a:rPr lang="en-US" smtClean="0"/>
-              <a:t>1/25/2024</a:t>
+              <a:t>2/6/2024</a:t>
             </a:fld>
             <a:endParaRPr lang="en-US"/>
           </a:p>
@@ -1944,7 +2088,7 @@
           <a:p>
             <a:fld id="{EEE316C7-8034-49CB-83EB-E718F1D3B021}" type="datetimeFigureOut">
               <a:rPr lang="en-US" smtClean="0"/>
-              <a:t>1/25/2024</a:t>
+              <a:t>2/6/2024</a:t>
             </a:fld>
             <a:endParaRPr lang="en-US"/>
           </a:p>
@@ -2221,7 +2365,7 @@
           <a:p>
             <a:fld id="{EEE316C7-8034-49CB-83EB-E718F1D3B021}" type="datetimeFigureOut">
               <a:rPr lang="en-US" smtClean="0"/>
-              <a:t>1/25/2024</a:t>
+              <a:t>2/6/2024</a:t>
             </a:fld>
             <a:endParaRPr lang="en-US"/>
           </a:p>
@@ -2478,7 +2622,7 @@
           <a:p>
             <a:fld id="{EEE316C7-8034-49CB-83EB-E718F1D3B021}" type="datetimeFigureOut">
               <a:rPr lang="en-US" smtClean="0"/>
-              <a:t>1/25/2024</a:t>
+              <a:t>2/6/2024</a:t>
             </a:fld>
             <a:endParaRPr lang="en-US"/>
           </a:p>
@@ -2691,7 +2835,7 @@
           <a:p>
             <a:fld id="{EEE316C7-8034-49CB-83EB-E718F1D3B021}" type="datetimeFigureOut">
               <a:rPr lang="en-US" smtClean="0"/>
-              <a:t>1/25/2024</a:t>
+              <a:t>2/6/2024</a:t>
             </a:fld>
             <a:endParaRPr lang="en-US"/>
           </a:p>
@@ -6051,6 +6195,66 @@
           <a:chExt cx="0" cy="0"/>
         </a:xfrm>
       </p:grpSpPr>
+      <p:pic>
+        <p:nvPicPr>
+          <p:cNvPr id="3" name="Picture 2">
+            <a:extLst>
+              <a:ext uri="{FF2B5EF4-FFF2-40B4-BE49-F238E27FC236}">
+                <a16:creationId xmlns:a16="http://schemas.microsoft.com/office/drawing/2014/main" id="{44E09E23-9618-7D3D-2F4A-22631C2020C5}"/>
+              </a:ext>
+            </a:extLst>
+          </p:cNvPr>
+          <p:cNvPicPr>
+            <a:picLocks noChangeAspect="1"/>
+          </p:cNvPicPr>
+          <p:nvPr/>
+        </p:nvPicPr>
+        <p:blipFill>
+          <a:blip r:embed="rId2"/>
+          <a:stretch>
+            <a:fillRect/>
+          </a:stretch>
+        </p:blipFill>
+        <p:spPr>
+          <a:xfrm>
+            <a:off x="144209" y="5486400"/>
+            <a:ext cx="4788569" cy="4105656"/>
+          </a:xfrm>
+          <a:prstGeom prst="rect">
+            <a:avLst/>
+          </a:prstGeom>
+        </p:spPr>
+      </p:pic>
+      <p:pic>
+        <p:nvPicPr>
+          <p:cNvPr id="6" name="Picture 5">
+            <a:extLst>
+              <a:ext uri="{FF2B5EF4-FFF2-40B4-BE49-F238E27FC236}">
+                <a16:creationId xmlns:a16="http://schemas.microsoft.com/office/drawing/2014/main" id="{42CAAD05-09EA-0075-774C-94BC6CB39F82}"/>
+              </a:ext>
+            </a:extLst>
+          </p:cNvPr>
+          <p:cNvPicPr>
+            <a:picLocks noChangeAspect="1"/>
+          </p:cNvPicPr>
+          <p:nvPr/>
+        </p:nvPicPr>
+        <p:blipFill>
+          <a:blip r:embed="rId3"/>
+          <a:stretch>
+            <a:fillRect/>
+          </a:stretch>
+        </p:blipFill>
+        <p:spPr>
+          <a:xfrm>
+            <a:off x="5125622" y="5486400"/>
+            <a:ext cx="4788569" cy="4105656"/>
+          </a:xfrm>
+          <a:prstGeom prst="rect">
+            <a:avLst/>
+          </a:prstGeom>
+        </p:spPr>
+      </p:pic>
       <p:sp>
         <p:nvSpPr>
           <p:cNvPr id="4" name="AutoShape 2">
@@ -6111,7 +6315,7 @@
           <p:nvPr/>
         </p:nvPicPr>
         <p:blipFill>
-          <a:blip r:embed="rId2"/>
+          <a:blip r:embed="rId4"/>
           <a:stretch>
             <a:fillRect/>
           </a:stretch>
@@ -6141,7 +6345,7 @@
           <p:nvPr/>
         </p:nvPicPr>
         <p:blipFill>
-          <a:blip r:embed="rId3"/>
+          <a:blip r:embed="rId5"/>
           <a:stretch>
             <a:fillRect/>
           </a:stretch>
@@ -6150,66 +6354,6 @@
           <a:xfrm>
             <a:off x="5196840" y="106364"/>
             <a:ext cx="4780529" cy="4107009"/>
-          </a:xfrm>
-          <a:prstGeom prst="rect">
-            <a:avLst/>
-          </a:prstGeom>
-        </p:spPr>
-      </p:pic>
-      <p:pic>
-        <p:nvPicPr>
-          <p:cNvPr id="13" name="Picture 12">
-            <a:extLst>
-              <a:ext uri="{FF2B5EF4-FFF2-40B4-BE49-F238E27FC236}">
-                <a16:creationId xmlns:a16="http://schemas.microsoft.com/office/drawing/2014/main" id="{04739ED9-7721-217F-0E41-A466E1AD9E0D}"/>
-              </a:ext>
-            </a:extLst>
-          </p:cNvPr>
-          <p:cNvPicPr>
-            <a:picLocks noChangeAspect="1"/>
-          </p:cNvPicPr>
-          <p:nvPr/>
-        </p:nvPicPr>
-        <p:blipFill>
-          <a:blip r:embed="rId4"/>
-          <a:stretch>
-            <a:fillRect/>
-          </a:stretch>
-        </p:blipFill>
-        <p:spPr>
-          <a:xfrm>
-            <a:off x="82606" y="5486400"/>
-            <a:ext cx="4778954" cy="4105656"/>
-          </a:xfrm>
-          <a:prstGeom prst="rect">
-            <a:avLst/>
-          </a:prstGeom>
-        </p:spPr>
-      </p:pic>
-      <p:pic>
-        <p:nvPicPr>
-          <p:cNvPr id="14" name="Picture 13">
-            <a:extLst>
-              <a:ext uri="{FF2B5EF4-FFF2-40B4-BE49-F238E27FC236}">
-                <a16:creationId xmlns:a16="http://schemas.microsoft.com/office/drawing/2014/main" id="{2C52D048-94EB-3075-1224-3A5326391097}"/>
-              </a:ext>
-            </a:extLst>
-          </p:cNvPr>
-          <p:cNvPicPr>
-            <a:picLocks noChangeAspect="1"/>
-          </p:cNvPicPr>
-          <p:nvPr/>
-        </p:nvPicPr>
-        <p:blipFill>
-          <a:blip r:embed="rId5"/>
-          <a:stretch>
-            <a:fillRect/>
-          </a:stretch>
-        </p:blipFill>
-        <p:spPr>
-          <a:xfrm>
-            <a:off x="5196840" y="5486400"/>
-            <a:ext cx="4778954" cy="4105656"/>
           </a:xfrm>
           <a:prstGeom prst="rect">
             <a:avLst/>
@@ -8976,10 +9120,3061 @@
           </a:graphicData>
         </a:graphic>
       </p:graphicFrame>
+      <p:sp>
+        <p:nvSpPr>
+          <p:cNvPr id="2" name="AutoShape 2">
+            <a:extLst>
+              <a:ext uri="{FF2B5EF4-FFF2-40B4-BE49-F238E27FC236}">
+                <a16:creationId xmlns:a16="http://schemas.microsoft.com/office/drawing/2014/main" id="{FFAF152D-0820-9D26-F584-6467D4614964}"/>
+              </a:ext>
+            </a:extLst>
+          </p:cNvPr>
+          <p:cNvSpPr>
+            <a:spLocks noChangeAspect="1" noChangeArrowheads="1"/>
+          </p:cNvSpPr>
+          <p:nvPr/>
+        </p:nvSpPr>
+        <p:spPr bwMode="auto">
+          <a:xfrm>
+            <a:off x="4876800" y="5334000"/>
+            <a:ext cx="304800" cy="304800"/>
+          </a:xfrm>
+          <a:prstGeom prst="rect">
+            <a:avLst/>
+          </a:prstGeom>
+          <a:noFill/>
+          <a:extLst>
+            <a:ext uri="{909E8E84-426E-40DD-AFC4-6F175D3DCCD1}">
+              <a14:hiddenFill xmlns:a14="http://schemas.microsoft.com/office/drawing/2010/main">
+                <a:solidFill>
+                  <a:srgbClr val="FFFFFF"/>
+                </a:solidFill>
+              </a14:hiddenFill>
+            </a:ext>
+          </a:extLst>
+        </p:spPr>
+        <p:txBody>
+          <a:bodyPr vert="horz" wrap="square" lIns="91440" tIns="45720" rIns="91440" bIns="45720" numCol="1" anchor="t" anchorCtr="0" compatLnSpc="1">
+            <a:prstTxWarp prst="textNoShape">
+              <a:avLst/>
+            </a:prstTxWarp>
+          </a:bodyPr>
+          <a:lstStyle/>
+          <a:p>
+            <a:endParaRPr lang="en-US"/>
+          </a:p>
+        </p:txBody>
+      </p:sp>
     </p:spTree>
     <p:extLst>
       <p:ext uri="{BB962C8B-B14F-4D97-AF65-F5344CB8AC3E}">
         <p14:creationId xmlns:p14="http://schemas.microsoft.com/office/powerpoint/2010/main" val="2288981012"/>
+      </p:ext>
+    </p:extLst>
+  </p:cSld>
+  <p:clrMapOvr>
+    <a:masterClrMapping/>
+  </p:clrMapOvr>
+</p:sld>
+</file>
+
+<file path=ppt/slides/slide3.xml><?xml version="1.0" encoding="utf-8"?>
+<p:sld xmlns:a="http://schemas.openxmlformats.org/drawingml/2006/main" xmlns:r="http://schemas.openxmlformats.org/officeDocument/2006/relationships" xmlns:p="http://schemas.openxmlformats.org/presentationml/2006/main">
+  <p:cSld>
+    <p:spTree>
+      <p:nvGrpSpPr>
+        <p:cNvPr id="1" name="">
+          <a:extLst>
+            <a:ext uri="{FF2B5EF4-FFF2-40B4-BE49-F238E27FC236}">
+              <a16:creationId xmlns:a16="http://schemas.microsoft.com/office/drawing/2014/main" id="{35BC50F4-7FCF-BCE7-8690-9689E633DDB9}"/>
+            </a:ext>
+          </a:extLst>
+        </p:cNvPr>
+        <p:cNvGrpSpPr/>
+        <p:nvPr/>
+      </p:nvGrpSpPr>
+      <p:grpSpPr>
+        <a:xfrm>
+          <a:off x="0" y="0"/>
+          <a:ext cx="0" cy="0"/>
+          <a:chOff x="0" y="0"/>
+          <a:chExt cx="0" cy="0"/>
+        </a:xfrm>
+      </p:grpSpPr>
+      <p:pic>
+        <p:nvPicPr>
+          <p:cNvPr id="3" name="Picture 2">
+            <a:extLst>
+              <a:ext uri="{FF2B5EF4-FFF2-40B4-BE49-F238E27FC236}">
+                <a16:creationId xmlns:a16="http://schemas.microsoft.com/office/drawing/2014/main" id="{FC1950B9-9BFC-3D44-9487-FE866C6FA93A}"/>
+              </a:ext>
+            </a:extLst>
+          </p:cNvPr>
+          <p:cNvPicPr>
+            <a:picLocks noChangeAspect="1"/>
+          </p:cNvPicPr>
+          <p:nvPr/>
+        </p:nvPicPr>
+        <p:blipFill>
+          <a:blip r:embed="rId2"/>
+          <a:stretch>
+            <a:fillRect/>
+          </a:stretch>
+        </p:blipFill>
+        <p:spPr>
+          <a:xfrm>
+            <a:off x="247986" y="85849"/>
+            <a:ext cx="4788569" cy="4105656"/>
+          </a:xfrm>
+          <a:prstGeom prst="rect">
+            <a:avLst/>
+          </a:prstGeom>
+        </p:spPr>
+      </p:pic>
+      <p:pic>
+        <p:nvPicPr>
+          <p:cNvPr id="6" name="Picture 5">
+            <a:extLst>
+              <a:ext uri="{FF2B5EF4-FFF2-40B4-BE49-F238E27FC236}">
+                <a16:creationId xmlns:a16="http://schemas.microsoft.com/office/drawing/2014/main" id="{1F7499E9-D6FF-D079-5608-068147518B48}"/>
+              </a:ext>
+            </a:extLst>
+          </p:cNvPr>
+          <p:cNvPicPr>
+            <a:picLocks noChangeAspect="1"/>
+          </p:cNvPicPr>
+          <p:nvPr/>
+        </p:nvPicPr>
+        <p:blipFill>
+          <a:blip r:embed="rId3"/>
+          <a:stretch>
+            <a:fillRect/>
+          </a:stretch>
+        </p:blipFill>
+        <p:spPr>
+          <a:xfrm>
+            <a:off x="5233111" y="140896"/>
+            <a:ext cx="4788569" cy="4105656"/>
+          </a:xfrm>
+          <a:prstGeom prst="rect">
+            <a:avLst/>
+          </a:prstGeom>
+        </p:spPr>
+      </p:pic>
+      <p:sp>
+        <p:nvSpPr>
+          <p:cNvPr id="4" name="AutoShape 2">
+            <a:extLst>
+              <a:ext uri="{FF2B5EF4-FFF2-40B4-BE49-F238E27FC236}">
+                <a16:creationId xmlns:a16="http://schemas.microsoft.com/office/drawing/2014/main" id="{C1BC0880-B4EB-EDF7-0CEC-25C2F572AB5F}"/>
+              </a:ext>
+            </a:extLst>
+          </p:cNvPr>
+          <p:cNvSpPr>
+            <a:spLocks noChangeAspect="1" noChangeArrowheads="1"/>
+          </p:cNvSpPr>
+          <p:nvPr/>
+        </p:nvSpPr>
+        <p:spPr bwMode="auto">
+          <a:xfrm>
+            <a:off x="4861560" y="5318760"/>
+            <a:ext cx="335280" cy="335280"/>
+          </a:xfrm>
+          <a:prstGeom prst="rect">
+            <a:avLst/>
+          </a:prstGeom>
+          <a:noFill/>
+          <a:extLst>
+            <a:ext uri="{909E8E84-426E-40DD-AFC4-6F175D3DCCD1}">
+              <a14:hiddenFill xmlns:a14="http://schemas.microsoft.com/office/drawing/2010/main">
+                <a:solidFill>
+                  <a:srgbClr val="FFFFFF"/>
+                </a:solidFill>
+              </a14:hiddenFill>
+            </a:ext>
+          </a:extLst>
+        </p:spPr>
+        <p:txBody>
+          <a:bodyPr vert="horz" wrap="square" lIns="100584" tIns="50292" rIns="100584" bIns="50292" numCol="1" anchor="t" anchorCtr="0" compatLnSpc="1">
+            <a:prstTxWarp prst="textNoShape">
+              <a:avLst/>
+            </a:prstTxWarp>
+          </a:bodyPr>
+          <a:lstStyle/>
+          <a:p>
+            <a:endParaRPr lang="en-US" sz="2277"/>
+          </a:p>
+        </p:txBody>
+      </p:sp>
+      <p:pic>
+        <p:nvPicPr>
+          <p:cNvPr id="11" name="Picture 10">
+            <a:extLst>
+              <a:ext uri="{FF2B5EF4-FFF2-40B4-BE49-F238E27FC236}">
+                <a16:creationId xmlns:a16="http://schemas.microsoft.com/office/drawing/2014/main" id="{CD53744D-8DEA-AEB2-DA04-DC828D78F678}"/>
+              </a:ext>
+            </a:extLst>
+          </p:cNvPr>
+          <p:cNvPicPr>
+            <a:picLocks noChangeAspect="1"/>
+          </p:cNvPicPr>
+          <p:nvPr/>
+        </p:nvPicPr>
+        <p:blipFill>
+          <a:blip r:embed="rId4"/>
+          <a:stretch>
+            <a:fillRect/>
+          </a:stretch>
+        </p:blipFill>
+        <p:spPr>
+          <a:xfrm>
+            <a:off x="252008" y="5574589"/>
+            <a:ext cx="4780528" cy="4107008"/>
+          </a:xfrm>
+          <a:prstGeom prst="rect">
+            <a:avLst/>
+          </a:prstGeom>
+        </p:spPr>
+      </p:pic>
+      <p:pic>
+        <p:nvPicPr>
+          <p:cNvPr id="12" name="Picture 11">
+            <a:extLst>
+              <a:ext uri="{FF2B5EF4-FFF2-40B4-BE49-F238E27FC236}">
+                <a16:creationId xmlns:a16="http://schemas.microsoft.com/office/drawing/2014/main" id="{154C3E3F-581A-8A8B-B35F-F5B616CFC329}"/>
+              </a:ext>
+            </a:extLst>
+          </p:cNvPr>
+          <p:cNvPicPr>
+            <a:picLocks noChangeAspect="1"/>
+          </p:cNvPicPr>
+          <p:nvPr/>
+        </p:nvPicPr>
+        <p:blipFill>
+          <a:blip r:embed="rId5"/>
+          <a:stretch>
+            <a:fillRect/>
+          </a:stretch>
+        </p:blipFill>
+        <p:spPr>
+          <a:xfrm>
+            <a:off x="5230537" y="5574589"/>
+            <a:ext cx="4780529" cy="4107009"/>
+          </a:xfrm>
+          <a:prstGeom prst="rect">
+            <a:avLst/>
+          </a:prstGeom>
+        </p:spPr>
+      </p:pic>
+      <p:graphicFrame>
+        <p:nvGraphicFramePr>
+          <p:cNvPr id="15" name="Table 14">
+            <a:extLst>
+              <a:ext uri="{FF2B5EF4-FFF2-40B4-BE49-F238E27FC236}">
+                <a16:creationId xmlns:a16="http://schemas.microsoft.com/office/drawing/2014/main" id="{500550DE-6465-2F17-318E-E1805AD784FD}"/>
+              </a:ext>
+            </a:extLst>
+          </p:cNvPr>
+          <p:cNvGraphicFramePr>
+            <a:graphicFrameLocks noGrp="1"/>
+          </p:cNvGraphicFramePr>
+          <p:nvPr>
+            <p:extLst>
+              <p:ext uri="{D42A27DB-BD31-4B8C-83A1-F6EECF244321}">
+                <p14:modId xmlns:p14="http://schemas.microsoft.com/office/powerpoint/2010/main" val="1789602137"/>
+              </p:ext>
+            </p:extLst>
+          </p:nvPr>
+        </p:nvGraphicFramePr>
+        <p:xfrm>
+          <a:off x="5981908" y="9676655"/>
+          <a:ext cx="3277785" cy="1179576"/>
+        </p:xfrm>
+        <a:graphic>
+          <a:graphicData uri="http://schemas.openxmlformats.org/drawingml/2006/table">
+            <a:tbl>
+              <a:tblPr firstRow="1" bandRow="1">
+                <a:tableStyleId>{5C22544A-7EE6-4342-B048-85BDC9FD1C3A}</a:tableStyleId>
+              </a:tblPr>
+              <a:tblGrid>
+                <a:gridCol w="1092595">
+                  <a:extLst>
+                    <a:ext uri="{9D8B030D-6E8A-4147-A177-3AD203B41FA5}">
+                      <a16:colId xmlns:a16="http://schemas.microsoft.com/office/drawing/2014/main" val="1032210984"/>
+                    </a:ext>
+                  </a:extLst>
+                </a:gridCol>
+                <a:gridCol w="1092595">
+                  <a:extLst>
+                    <a:ext uri="{9D8B030D-6E8A-4147-A177-3AD203B41FA5}">
+                      <a16:colId xmlns:a16="http://schemas.microsoft.com/office/drawing/2014/main" val="3050461674"/>
+                    </a:ext>
+                  </a:extLst>
+                </a:gridCol>
+                <a:gridCol w="1092595">
+                  <a:extLst>
+                    <a:ext uri="{9D8B030D-6E8A-4147-A177-3AD203B41FA5}">
+                      <a16:colId xmlns:a16="http://schemas.microsoft.com/office/drawing/2014/main" val="1708856229"/>
+                    </a:ext>
+                  </a:extLst>
+                </a:gridCol>
+              </a:tblGrid>
+              <a:tr h="370840">
+                <a:tc>
+                  <a:txBody>
+                    <a:bodyPr/>
+                    <a:lstStyle/>
+                    <a:p>
+                      <a:pPr algn="ctr"/>
+                      <a:endParaRPr lang="en-US" dirty="0">
+                        <a:solidFill>
+                          <a:schemeClr val="tx1"/>
+                        </a:solidFill>
+                      </a:endParaRPr>
+                    </a:p>
+                  </a:txBody>
+                  <a:tcPr>
+                    <a:lnL w="12700" cap="flat" cmpd="sng" algn="ctr">
+                      <a:noFill/>
+                      <a:prstDash val="solid"/>
+                      <a:round/>
+                      <a:headEnd type="none" w="med" len="med"/>
+                      <a:tailEnd type="none" w="med" len="med"/>
+                    </a:lnL>
+                    <a:lnR w="12700" cap="flat" cmpd="sng" algn="ctr">
+                      <a:solidFill>
+                        <a:schemeClr val="tx1"/>
+                      </a:solidFill>
+                      <a:prstDash val="solid"/>
+                      <a:round/>
+                      <a:headEnd type="none" w="med" len="med"/>
+                      <a:tailEnd type="none" w="med" len="med"/>
+                    </a:lnR>
+                    <a:lnT w="12700" cap="flat" cmpd="sng" algn="ctr">
+                      <a:noFill/>
+                      <a:prstDash val="solid"/>
+                      <a:round/>
+                      <a:headEnd type="none" w="med" len="med"/>
+                      <a:tailEnd type="none" w="med" len="med"/>
+                    </a:lnT>
+                    <a:lnB w="12700" cap="flat" cmpd="sng" algn="ctr">
+                      <a:solidFill>
+                        <a:schemeClr val="tx1"/>
+                      </a:solidFill>
+                      <a:prstDash val="solid"/>
+                      <a:round/>
+                      <a:headEnd type="none" w="med" len="med"/>
+                      <a:tailEnd type="none" w="med" len="med"/>
+                    </a:lnB>
+                    <a:lnTlToBr w="12700" cmpd="sng">
+                      <a:noFill/>
+                      <a:prstDash val="solid"/>
+                    </a:lnTlToBr>
+                    <a:lnBlToTr w="12700" cmpd="sng">
+                      <a:noFill/>
+                      <a:prstDash val="solid"/>
+                    </a:lnBlToTr>
+                    <a:solidFill>
+                      <a:schemeClr val="bg1"/>
+                    </a:solidFill>
+                  </a:tcPr>
+                </a:tc>
+                <a:tc>
+                  <a:txBody>
+                    <a:bodyPr/>
+                    <a:lstStyle/>
+                    <a:p>
+                      <a:pPr algn="ctr"/>
+                      <a:r>
+                        <a:rPr lang="en-US" dirty="0">
+                          <a:solidFill>
+                            <a:schemeClr val="tx1"/>
+                          </a:solidFill>
+                        </a:rPr>
+                        <a:t>↓70min</a:t>
+                      </a:r>
+                    </a:p>
+                  </a:txBody>
+                  <a:tcPr>
+                    <a:lnL w="12700" cap="flat" cmpd="sng" algn="ctr">
+                      <a:solidFill>
+                        <a:schemeClr val="tx1"/>
+                      </a:solidFill>
+                      <a:prstDash val="solid"/>
+                      <a:round/>
+                      <a:headEnd type="none" w="med" len="med"/>
+                      <a:tailEnd type="none" w="med" len="med"/>
+                    </a:lnL>
+                    <a:lnR w="12700" cap="flat" cmpd="sng" algn="ctr">
+                      <a:solidFill>
+                        <a:schemeClr val="tx1"/>
+                      </a:solidFill>
+                      <a:prstDash val="solid"/>
+                      <a:round/>
+                      <a:headEnd type="none" w="med" len="med"/>
+                      <a:tailEnd type="none" w="med" len="med"/>
+                    </a:lnR>
+                    <a:lnT w="12700" cap="flat" cmpd="sng" algn="ctr">
+                      <a:noFill/>
+                      <a:prstDash val="solid"/>
+                      <a:round/>
+                      <a:headEnd type="none" w="med" len="med"/>
+                      <a:tailEnd type="none" w="med" len="med"/>
+                    </a:lnT>
+                    <a:lnB w="12700" cap="flat" cmpd="sng" algn="ctr">
+                      <a:solidFill>
+                        <a:schemeClr val="tx1"/>
+                      </a:solidFill>
+                      <a:prstDash val="solid"/>
+                      <a:round/>
+                      <a:headEnd type="none" w="med" len="med"/>
+                      <a:tailEnd type="none" w="med" len="med"/>
+                    </a:lnB>
+                    <a:lnTlToBr w="12700" cmpd="sng">
+                      <a:noFill/>
+                      <a:prstDash val="solid"/>
+                    </a:lnTlToBr>
+                    <a:lnBlToTr w="12700" cmpd="sng">
+                      <a:noFill/>
+                      <a:prstDash val="solid"/>
+                    </a:lnBlToTr>
+                    <a:solidFill>
+                      <a:schemeClr val="bg1"/>
+                    </a:solidFill>
+                  </a:tcPr>
+                </a:tc>
+                <a:tc>
+                  <a:txBody>
+                    <a:bodyPr/>
+                    <a:lstStyle/>
+                    <a:p>
+                      <a:pPr algn="ctr"/>
+                      <a:r>
+                        <a:rPr lang="en-US" b="1" dirty="0">
+                          <a:solidFill>
+                            <a:schemeClr val="tx1"/>
+                          </a:solidFill>
+                        </a:rPr>
+                        <a:t>↑</a:t>
+                      </a:r>
+                      <a:r>
+                        <a:rPr lang="en-US" dirty="0">
+                          <a:solidFill>
+                            <a:schemeClr val="tx1"/>
+                          </a:solidFill>
+                        </a:rPr>
+                        <a:t>70min</a:t>
+                      </a:r>
+                    </a:p>
+                  </a:txBody>
+                  <a:tcPr>
+                    <a:lnL w="12700" cap="flat" cmpd="sng" algn="ctr">
+                      <a:solidFill>
+                        <a:schemeClr val="tx1"/>
+                      </a:solidFill>
+                      <a:prstDash val="solid"/>
+                      <a:round/>
+                      <a:headEnd type="none" w="med" len="med"/>
+                      <a:tailEnd type="none" w="med" len="med"/>
+                    </a:lnL>
+                    <a:lnR w="12700" cap="flat" cmpd="sng" algn="ctr">
+                      <a:noFill/>
+                      <a:prstDash val="solid"/>
+                      <a:round/>
+                      <a:headEnd type="none" w="med" len="med"/>
+                      <a:tailEnd type="none" w="med" len="med"/>
+                    </a:lnR>
+                    <a:lnT w="12700" cap="flat" cmpd="sng" algn="ctr">
+                      <a:noFill/>
+                      <a:prstDash val="solid"/>
+                      <a:round/>
+                      <a:headEnd type="none" w="med" len="med"/>
+                      <a:tailEnd type="none" w="med" len="med"/>
+                    </a:lnT>
+                    <a:lnB w="12700" cap="flat" cmpd="sng" algn="ctr">
+                      <a:solidFill>
+                        <a:schemeClr val="tx1"/>
+                      </a:solidFill>
+                      <a:prstDash val="solid"/>
+                      <a:round/>
+                      <a:headEnd type="none" w="med" len="med"/>
+                      <a:tailEnd type="none" w="med" len="med"/>
+                    </a:lnB>
+                    <a:lnTlToBr w="12700" cmpd="sng">
+                      <a:noFill/>
+                      <a:prstDash val="solid"/>
+                    </a:lnTlToBr>
+                    <a:lnBlToTr w="12700" cmpd="sng">
+                      <a:noFill/>
+                      <a:prstDash val="solid"/>
+                    </a:lnBlToTr>
+                    <a:solidFill>
+                      <a:schemeClr val="bg1"/>
+                    </a:solidFill>
+                  </a:tcPr>
+                </a:tc>
+                <a:extLst>
+                  <a:ext uri="{0D108BD9-81ED-4DB2-BD59-A6C34878D82A}">
+                    <a16:rowId xmlns:a16="http://schemas.microsoft.com/office/drawing/2014/main" val="1378381846"/>
+                  </a:ext>
+                </a:extLst>
+              </a:tr>
+              <a:tr h="370840">
+                <a:tc>
+                  <a:txBody>
+                    <a:bodyPr/>
+                    <a:lstStyle/>
+                    <a:p>
+                      <a:pPr algn="ctr"/>
+                      <a:r>
+                        <a:rPr lang="en-US" b="1" dirty="0">
+                          <a:solidFill>
+                            <a:schemeClr val="tx1"/>
+                          </a:solidFill>
+                        </a:rPr>
+                        <a:t>↑25hr</a:t>
+                      </a:r>
+                    </a:p>
+                  </a:txBody>
+                  <a:tcPr>
+                    <a:lnL w="12700" cap="flat" cmpd="sng" algn="ctr">
+                      <a:noFill/>
+                      <a:prstDash val="solid"/>
+                      <a:round/>
+                      <a:headEnd type="none" w="med" len="med"/>
+                      <a:tailEnd type="none" w="med" len="med"/>
+                    </a:lnL>
+                    <a:lnR w="12700" cap="flat" cmpd="sng" algn="ctr">
+                      <a:solidFill>
+                        <a:schemeClr val="tx1"/>
+                      </a:solidFill>
+                      <a:prstDash val="solid"/>
+                      <a:round/>
+                      <a:headEnd type="none" w="med" len="med"/>
+                      <a:tailEnd type="none" w="med" len="med"/>
+                    </a:lnR>
+                    <a:lnT w="12700" cap="flat" cmpd="sng" algn="ctr">
+                      <a:solidFill>
+                        <a:schemeClr val="tx1"/>
+                      </a:solidFill>
+                      <a:prstDash val="solid"/>
+                      <a:round/>
+                      <a:headEnd type="none" w="med" len="med"/>
+                      <a:tailEnd type="none" w="med" len="med"/>
+                    </a:lnT>
+                    <a:lnB w="12700" cap="flat" cmpd="sng" algn="ctr">
+                      <a:solidFill>
+                        <a:schemeClr val="tx1"/>
+                      </a:solidFill>
+                      <a:prstDash val="solid"/>
+                      <a:round/>
+                      <a:headEnd type="none" w="med" len="med"/>
+                      <a:tailEnd type="none" w="med" len="med"/>
+                    </a:lnB>
+                    <a:lnTlToBr w="12700" cmpd="sng">
+                      <a:noFill/>
+                      <a:prstDash val="solid"/>
+                    </a:lnTlToBr>
+                    <a:lnBlToTr w="12700" cmpd="sng">
+                      <a:noFill/>
+                      <a:prstDash val="solid"/>
+                    </a:lnBlToTr>
+                    <a:solidFill>
+                      <a:schemeClr val="bg1"/>
+                    </a:solidFill>
+                  </a:tcPr>
+                </a:tc>
+                <a:tc>
+                  <a:txBody>
+                    <a:bodyPr/>
+                    <a:lstStyle/>
+                    <a:p>
+                      <a:pPr algn="ctr"/>
+                      <a:r>
+                        <a:rPr lang="en-US" dirty="0">
+                          <a:solidFill>
+                            <a:schemeClr val="tx1"/>
+                          </a:solidFill>
+                        </a:rPr>
+                        <a:t>16</a:t>
+                      </a:r>
+                    </a:p>
+                  </a:txBody>
+                  <a:tcPr>
+                    <a:lnL w="12700" cap="flat" cmpd="sng" algn="ctr">
+                      <a:solidFill>
+                        <a:schemeClr val="tx1"/>
+                      </a:solidFill>
+                      <a:prstDash val="solid"/>
+                      <a:round/>
+                      <a:headEnd type="none" w="med" len="med"/>
+                      <a:tailEnd type="none" w="med" len="med"/>
+                    </a:lnL>
+                    <a:lnR w="12700" cap="flat" cmpd="sng" algn="ctr">
+                      <a:solidFill>
+                        <a:schemeClr val="tx1"/>
+                      </a:solidFill>
+                      <a:prstDash val="solid"/>
+                      <a:round/>
+                      <a:headEnd type="none" w="med" len="med"/>
+                      <a:tailEnd type="none" w="med" len="med"/>
+                    </a:lnR>
+                    <a:lnT w="12700" cap="flat" cmpd="sng" algn="ctr">
+                      <a:solidFill>
+                        <a:schemeClr val="tx1"/>
+                      </a:solidFill>
+                      <a:prstDash val="solid"/>
+                      <a:round/>
+                      <a:headEnd type="none" w="med" len="med"/>
+                      <a:tailEnd type="none" w="med" len="med"/>
+                    </a:lnT>
+                    <a:lnB w="12700" cap="flat" cmpd="sng" algn="ctr">
+                      <a:solidFill>
+                        <a:schemeClr val="tx1"/>
+                      </a:solidFill>
+                      <a:prstDash val="solid"/>
+                      <a:round/>
+                      <a:headEnd type="none" w="med" len="med"/>
+                      <a:tailEnd type="none" w="med" len="med"/>
+                    </a:lnB>
+                    <a:lnTlToBr w="12700" cmpd="sng">
+                      <a:noFill/>
+                      <a:prstDash val="solid"/>
+                    </a:lnTlToBr>
+                    <a:lnBlToTr w="12700" cmpd="sng">
+                      <a:noFill/>
+                      <a:prstDash val="solid"/>
+                    </a:lnBlToTr>
+                    <a:solidFill>
+                      <a:schemeClr val="bg1"/>
+                    </a:solidFill>
+                  </a:tcPr>
+                </a:tc>
+                <a:tc>
+                  <a:txBody>
+                    <a:bodyPr/>
+                    <a:lstStyle/>
+                    <a:p>
+                      <a:pPr algn="ctr"/>
+                      <a:r>
+                        <a:rPr lang="en-US" dirty="0">
+                          <a:solidFill>
+                            <a:schemeClr val="tx1"/>
+                          </a:solidFill>
+                        </a:rPr>
+                        <a:t>8</a:t>
+                      </a:r>
+                    </a:p>
+                  </a:txBody>
+                  <a:tcPr>
+                    <a:lnL w="12700" cap="flat" cmpd="sng" algn="ctr">
+                      <a:solidFill>
+                        <a:schemeClr val="tx1"/>
+                      </a:solidFill>
+                      <a:prstDash val="solid"/>
+                      <a:round/>
+                      <a:headEnd type="none" w="med" len="med"/>
+                      <a:tailEnd type="none" w="med" len="med"/>
+                    </a:lnL>
+                    <a:lnR w="12700" cap="flat" cmpd="sng" algn="ctr">
+                      <a:noFill/>
+                      <a:prstDash val="solid"/>
+                      <a:round/>
+                      <a:headEnd type="none" w="med" len="med"/>
+                      <a:tailEnd type="none" w="med" len="med"/>
+                    </a:lnR>
+                    <a:lnT w="12700" cap="flat" cmpd="sng" algn="ctr">
+                      <a:solidFill>
+                        <a:schemeClr val="tx1"/>
+                      </a:solidFill>
+                      <a:prstDash val="solid"/>
+                      <a:round/>
+                      <a:headEnd type="none" w="med" len="med"/>
+                      <a:tailEnd type="none" w="med" len="med"/>
+                    </a:lnT>
+                    <a:lnB w="12700" cap="flat" cmpd="sng" algn="ctr">
+                      <a:solidFill>
+                        <a:schemeClr val="tx1"/>
+                      </a:solidFill>
+                      <a:prstDash val="solid"/>
+                      <a:round/>
+                      <a:headEnd type="none" w="med" len="med"/>
+                      <a:tailEnd type="none" w="med" len="med"/>
+                    </a:lnB>
+                    <a:lnTlToBr w="12700" cmpd="sng">
+                      <a:noFill/>
+                      <a:prstDash val="solid"/>
+                    </a:lnTlToBr>
+                    <a:lnBlToTr w="12700" cmpd="sng">
+                      <a:noFill/>
+                      <a:prstDash val="solid"/>
+                    </a:lnBlToTr>
+                    <a:solidFill>
+                      <a:schemeClr val="bg1"/>
+                    </a:solidFill>
+                  </a:tcPr>
+                </a:tc>
+                <a:extLst>
+                  <a:ext uri="{0D108BD9-81ED-4DB2-BD59-A6C34878D82A}">
+                    <a16:rowId xmlns:a16="http://schemas.microsoft.com/office/drawing/2014/main" val="2904357014"/>
+                  </a:ext>
+                </a:extLst>
+              </a:tr>
+              <a:tr h="370840">
+                <a:tc>
+                  <a:txBody>
+                    <a:bodyPr/>
+                    <a:lstStyle/>
+                    <a:p>
+                      <a:pPr algn="ctr"/>
+                      <a:r>
+                        <a:rPr lang="en-US" b="1" dirty="0">
+                          <a:solidFill>
+                            <a:schemeClr val="tx1"/>
+                          </a:solidFill>
+                        </a:rPr>
+                        <a:t>↓25hr</a:t>
+                      </a:r>
+                    </a:p>
+                  </a:txBody>
+                  <a:tcPr>
+                    <a:lnL w="12700" cap="flat" cmpd="sng" algn="ctr">
+                      <a:noFill/>
+                      <a:prstDash val="solid"/>
+                      <a:round/>
+                      <a:headEnd type="none" w="med" len="med"/>
+                      <a:tailEnd type="none" w="med" len="med"/>
+                    </a:lnL>
+                    <a:lnR w="12700" cap="flat" cmpd="sng" algn="ctr">
+                      <a:solidFill>
+                        <a:schemeClr val="tx1"/>
+                      </a:solidFill>
+                      <a:prstDash val="solid"/>
+                      <a:round/>
+                      <a:headEnd type="none" w="med" len="med"/>
+                      <a:tailEnd type="none" w="med" len="med"/>
+                    </a:lnR>
+                    <a:lnT w="12700" cap="flat" cmpd="sng" algn="ctr">
+                      <a:solidFill>
+                        <a:schemeClr val="tx1"/>
+                      </a:solidFill>
+                      <a:prstDash val="solid"/>
+                      <a:round/>
+                      <a:headEnd type="none" w="med" len="med"/>
+                      <a:tailEnd type="none" w="med" len="med"/>
+                    </a:lnT>
+                    <a:lnB w="12700" cap="flat" cmpd="sng" algn="ctr">
+                      <a:noFill/>
+                      <a:prstDash val="solid"/>
+                      <a:round/>
+                      <a:headEnd type="none" w="med" len="med"/>
+                      <a:tailEnd type="none" w="med" len="med"/>
+                    </a:lnB>
+                    <a:lnTlToBr w="12700" cmpd="sng">
+                      <a:noFill/>
+                      <a:prstDash val="solid"/>
+                    </a:lnTlToBr>
+                    <a:lnBlToTr w="12700" cmpd="sng">
+                      <a:noFill/>
+                      <a:prstDash val="solid"/>
+                    </a:lnBlToTr>
+                    <a:solidFill>
+                      <a:schemeClr val="bg1"/>
+                    </a:solidFill>
+                  </a:tcPr>
+                </a:tc>
+                <a:tc>
+                  <a:txBody>
+                    <a:bodyPr/>
+                    <a:lstStyle/>
+                    <a:p>
+                      <a:pPr algn="ctr"/>
+                      <a:r>
+                        <a:rPr lang="en-US" dirty="0">
+                          <a:solidFill>
+                            <a:schemeClr val="tx1"/>
+                          </a:solidFill>
+                        </a:rPr>
+                        <a:t>12</a:t>
+                      </a:r>
+                    </a:p>
+                  </a:txBody>
+                  <a:tcPr>
+                    <a:lnL w="12700" cap="flat" cmpd="sng" algn="ctr">
+                      <a:solidFill>
+                        <a:schemeClr val="tx1"/>
+                      </a:solidFill>
+                      <a:prstDash val="solid"/>
+                      <a:round/>
+                      <a:headEnd type="none" w="med" len="med"/>
+                      <a:tailEnd type="none" w="med" len="med"/>
+                    </a:lnL>
+                    <a:lnR w="12700" cap="flat" cmpd="sng" algn="ctr">
+                      <a:solidFill>
+                        <a:schemeClr val="tx1"/>
+                      </a:solidFill>
+                      <a:prstDash val="solid"/>
+                      <a:round/>
+                      <a:headEnd type="none" w="med" len="med"/>
+                      <a:tailEnd type="none" w="med" len="med"/>
+                    </a:lnR>
+                    <a:lnT w="12700" cap="flat" cmpd="sng" algn="ctr">
+                      <a:solidFill>
+                        <a:schemeClr val="tx1"/>
+                      </a:solidFill>
+                      <a:prstDash val="solid"/>
+                      <a:round/>
+                      <a:headEnd type="none" w="med" len="med"/>
+                      <a:tailEnd type="none" w="med" len="med"/>
+                    </a:lnT>
+                    <a:lnB w="12700" cap="flat" cmpd="sng" algn="ctr">
+                      <a:noFill/>
+                      <a:prstDash val="solid"/>
+                      <a:round/>
+                      <a:headEnd type="none" w="med" len="med"/>
+                      <a:tailEnd type="none" w="med" len="med"/>
+                    </a:lnB>
+                    <a:lnTlToBr w="12700" cmpd="sng">
+                      <a:noFill/>
+                      <a:prstDash val="solid"/>
+                    </a:lnTlToBr>
+                    <a:lnBlToTr w="12700" cmpd="sng">
+                      <a:noFill/>
+                      <a:prstDash val="solid"/>
+                    </a:lnBlToTr>
+                    <a:solidFill>
+                      <a:schemeClr val="bg1"/>
+                    </a:solidFill>
+                  </a:tcPr>
+                </a:tc>
+                <a:tc>
+                  <a:txBody>
+                    <a:bodyPr/>
+                    <a:lstStyle/>
+                    <a:p>
+                      <a:pPr algn="ctr"/>
+                      <a:r>
+                        <a:rPr lang="en-US" dirty="0">
+                          <a:solidFill>
+                            <a:schemeClr val="tx1"/>
+                          </a:solidFill>
+                        </a:rPr>
+                        <a:t>10</a:t>
+                      </a:r>
+                    </a:p>
+                  </a:txBody>
+                  <a:tcPr>
+                    <a:lnL w="12700" cap="flat" cmpd="sng" algn="ctr">
+                      <a:solidFill>
+                        <a:schemeClr val="tx1"/>
+                      </a:solidFill>
+                      <a:prstDash val="solid"/>
+                      <a:round/>
+                      <a:headEnd type="none" w="med" len="med"/>
+                      <a:tailEnd type="none" w="med" len="med"/>
+                    </a:lnL>
+                    <a:lnR w="12700" cap="flat" cmpd="sng" algn="ctr">
+                      <a:noFill/>
+                      <a:prstDash val="solid"/>
+                      <a:round/>
+                      <a:headEnd type="none" w="med" len="med"/>
+                      <a:tailEnd type="none" w="med" len="med"/>
+                    </a:lnR>
+                    <a:lnT w="12700" cap="flat" cmpd="sng" algn="ctr">
+                      <a:solidFill>
+                        <a:schemeClr val="tx1"/>
+                      </a:solidFill>
+                      <a:prstDash val="solid"/>
+                      <a:round/>
+                      <a:headEnd type="none" w="med" len="med"/>
+                      <a:tailEnd type="none" w="med" len="med"/>
+                    </a:lnT>
+                    <a:lnB w="12700" cap="flat" cmpd="sng" algn="ctr">
+                      <a:noFill/>
+                      <a:prstDash val="solid"/>
+                      <a:round/>
+                      <a:headEnd type="none" w="med" len="med"/>
+                      <a:tailEnd type="none" w="med" len="med"/>
+                    </a:lnB>
+                    <a:lnTlToBr w="12700" cmpd="sng">
+                      <a:noFill/>
+                      <a:prstDash val="solid"/>
+                    </a:lnTlToBr>
+                    <a:lnBlToTr w="12700" cmpd="sng">
+                      <a:noFill/>
+                      <a:prstDash val="solid"/>
+                    </a:lnBlToTr>
+                    <a:solidFill>
+                      <a:schemeClr val="bg1"/>
+                    </a:solidFill>
+                  </a:tcPr>
+                </a:tc>
+                <a:extLst>
+                  <a:ext uri="{0D108BD9-81ED-4DB2-BD59-A6C34878D82A}">
+                    <a16:rowId xmlns:a16="http://schemas.microsoft.com/office/drawing/2014/main" val="383195842"/>
+                  </a:ext>
+                </a:extLst>
+              </a:tr>
+            </a:tbl>
+          </a:graphicData>
+        </a:graphic>
+      </p:graphicFrame>
+      <p:sp>
+        <p:nvSpPr>
+          <p:cNvPr id="19" name="TextBox 18">
+            <a:extLst>
+              <a:ext uri="{FF2B5EF4-FFF2-40B4-BE49-F238E27FC236}">
+                <a16:creationId xmlns:a16="http://schemas.microsoft.com/office/drawing/2014/main" id="{DA38D39E-1874-2A42-B4F6-B09C0522612A}"/>
+              </a:ext>
+            </a:extLst>
+          </p:cNvPr>
+          <p:cNvSpPr txBox="1"/>
+          <p:nvPr/>
+        </p:nvSpPr>
+        <p:spPr>
+          <a:xfrm>
+            <a:off x="81031" y="0"/>
+            <a:ext cx="412292" cy="400110"/>
+          </a:xfrm>
+          <a:prstGeom prst="rect">
+            <a:avLst/>
+          </a:prstGeom>
+          <a:noFill/>
+        </p:spPr>
+        <p:txBody>
+          <a:bodyPr wrap="none" rtlCol="0">
+            <a:spAutoFit/>
+          </a:bodyPr>
+          <a:lstStyle/>
+          <a:p>
+            <a:r>
+              <a:rPr lang="en-US" sz="2000" dirty="0"/>
+              <a:t>A)</a:t>
+            </a:r>
+          </a:p>
+        </p:txBody>
+      </p:sp>
+      <p:sp>
+        <p:nvSpPr>
+          <p:cNvPr id="20" name="TextBox 19">
+            <a:extLst>
+              <a:ext uri="{FF2B5EF4-FFF2-40B4-BE49-F238E27FC236}">
+                <a16:creationId xmlns:a16="http://schemas.microsoft.com/office/drawing/2014/main" id="{3F78EAAA-8CBB-CAE7-3FF3-E23EB6A2D485}"/>
+              </a:ext>
+            </a:extLst>
+          </p:cNvPr>
+          <p:cNvSpPr txBox="1"/>
+          <p:nvPr/>
+        </p:nvSpPr>
+        <p:spPr>
+          <a:xfrm>
+            <a:off x="5029200" y="0"/>
+            <a:ext cx="402674" cy="400110"/>
+          </a:xfrm>
+          <a:prstGeom prst="rect">
+            <a:avLst/>
+          </a:prstGeom>
+          <a:noFill/>
+        </p:spPr>
+        <p:txBody>
+          <a:bodyPr wrap="none" rtlCol="0">
+            <a:spAutoFit/>
+          </a:bodyPr>
+          <a:lstStyle/>
+          <a:p>
+            <a:r>
+              <a:rPr lang="en-US" sz="2000" dirty="0"/>
+              <a:t>B)</a:t>
+            </a:r>
+          </a:p>
+        </p:txBody>
+      </p:sp>
+      <p:sp>
+        <p:nvSpPr>
+          <p:cNvPr id="21" name="TextBox 20">
+            <a:extLst>
+              <a:ext uri="{FF2B5EF4-FFF2-40B4-BE49-F238E27FC236}">
+                <a16:creationId xmlns:a16="http://schemas.microsoft.com/office/drawing/2014/main" id="{CE276DD0-044F-1CBF-68D8-C4797059776B}"/>
+              </a:ext>
+            </a:extLst>
+          </p:cNvPr>
+          <p:cNvSpPr txBox="1"/>
+          <p:nvPr/>
+        </p:nvSpPr>
+        <p:spPr>
+          <a:xfrm>
+            <a:off x="9947" y="5512037"/>
+            <a:ext cx="399468" cy="400110"/>
+          </a:xfrm>
+          <a:prstGeom prst="rect">
+            <a:avLst/>
+          </a:prstGeom>
+          <a:noFill/>
+        </p:spPr>
+        <p:txBody>
+          <a:bodyPr wrap="none" rtlCol="0">
+            <a:spAutoFit/>
+          </a:bodyPr>
+          <a:lstStyle/>
+          <a:p>
+            <a:r>
+              <a:rPr lang="en-US" sz="2000" dirty="0"/>
+              <a:t>C)</a:t>
+            </a:r>
+          </a:p>
+        </p:txBody>
+      </p:sp>
+      <p:sp>
+        <p:nvSpPr>
+          <p:cNvPr id="22" name="TextBox 21">
+            <a:extLst>
+              <a:ext uri="{FF2B5EF4-FFF2-40B4-BE49-F238E27FC236}">
+                <a16:creationId xmlns:a16="http://schemas.microsoft.com/office/drawing/2014/main" id="{16252426-79F6-5FA5-57D0-2F4685101E43}"/>
+              </a:ext>
+            </a:extLst>
+          </p:cNvPr>
+          <p:cNvSpPr txBox="1"/>
+          <p:nvPr/>
+        </p:nvSpPr>
+        <p:spPr>
+          <a:xfrm>
+            <a:off x="4997106" y="5522079"/>
+            <a:ext cx="420308" cy="400110"/>
+          </a:xfrm>
+          <a:prstGeom prst="rect">
+            <a:avLst/>
+          </a:prstGeom>
+          <a:noFill/>
+        </p:spPr>
+        <p:txBody>
+          <a:bodyPr wrap="none" rtlCol="0">
+            <a:spAutoFit/>
+          </a:bodyPr>
+          <a:lstStyle/>
+          <a:p>
+            <a:r>
+              <a:rPr lang="en-US" sz="2000" dirty="0"/>
+              <a:t>D)</a:t>
+            </a:r>
+          </a:p>
+        </p:txBody>
+      </p:sp>
+      <p:graphicFrame>
+        <p:nvGraphicFramePr>
+          <p:cNvPr id="23" name="Table 22">
+            <a:extLst>
+              <a:ext uri="{FF2B5EF4-FFF2-40B4-BE49-F238E27FC236}">
+                <a16:creationId xmlns:a16="http://schemas.microsoft.com/office/drawing/2014/main" id="{B36AB556-8C01-940A-707A-793C587E74FD}"/>
+              </a:ext>
+            </a:extLst>
+          </p:cNvPr>
+          <p:cNvGraphicFramePr>
+            <a:graphicFrameLocks noGrp="1"/>
+          </p:cNvGraphicFramePr>
+          <p:nvPr>
+            <p:extLst>
+              <p:ext uri="{D42A27DB-BD31-4B8C-83A1-F6EECF244321}">
+                <p14:modId xmlns:p14="http://schemas.microsoft.com/office/powerpoint/2010/main" val="673982213"/>
+              </p:ext>
+            </p:extLst>
+          </p:nvPr>
+        </p:nvGraphicFramePr>
+        <p:xfrm>
+          <a:off x="1003379" y="4246127"/>
+          <a:ext cx="3277785" cy="1179576"/>
+        </p:xfrm>
+        <a:graphic>
+          <a:graphicData uri="http://schemas.openxmlformats.org/drawingml/2006/table">
+            <a:tbl>
+              <a:tblPr firstRow="1" bandRow="1">
+                <a:tableStyleId>{5C22544A-7EE6-4342-B048-85BDC9FD1C3A}</a:tableStyleId>
+              </a:tblPr>
+              <a:tblGrid>
+                <a:gridCol w="1092595">
+                  <a:extLst>
+                    <a:ext uri="{9D8B030D-6E8A-4147-A177-3AD203B41FA5}">
+                      <a16:colId xmlns:a16="http://schemas.microsoft.com/office/drawing/2014/main" val="1032210984"/>
+                    </a:ext>
+                  </a:extLst>
+                </a:gridCol>
+                <a:gridCol w="1092595">
+                  <a:extLst>
+                    <a:ext uri="{9D8B030D-6E8A-4147-A177-3AD203B41FA5}">
+                      <a16:colId xmlns:a16="http://schemas.microsoft.com/office/drawing/2014/main" val="3050461674"/>
+                    </a:ext>
+                  </a:extLst>
+                </a:gridCol>
+                <a:gridCol w="1092595">
+                  <a:extLst>
+                    <a:ext uri="{9D8B030D-6E8A-4147-A177-3AD203B41FA5}">
+                      <a16:colId xmlns:a16="http://schemas.microsoft.com/office/drawing/2014/main" val="1708856229"/>
+                    </a:ext>
+                  </a:extLst>
+                </a:gridCol>
+              </a:tblGrid>
+              <a:tr h="370840">
+                <a:tc>
+                  <a:txBody>
+                    <a:bodyPr/>
+                    <a:lstStyle/>
+                    <a:p>
+                      <a:pPr algn="ctr"/>
+                      <a:endParaRPr lang="en-US" dirty="0">
+                        <a:solidFill>
+                          <a:schemeClr val="tx1"/>
+                        </a:solidFill>
+                      </a:endParaRPr>
+                    </a:p>
+                  </a:txBody>
+                  <a:tcPr>
+                    <a:lnL w="12700" cap="flat" cmpd="sng" algn="ctr">
+                      <a:noFill/>
+                      <a:prstDash val="solid"/>
+                      <a:round/>
+                      <a:headEnd type="none" w="med" len="med"/>
+                      <a:tailEnd type="none" w="med" len="med"/>
+                    </a:lnL>
+                    <a:lnR w="12700" cap="flat" cmpd="sng" algn="ctr">
+                      <a:solidFill>
+                        <a:schemeClr val="tx1"/>
+                      </a:solidFill>
+                      <a:prstDash val="solid"/>
+                      <a:round/>
+                      <a:headEnd type="none" w="med" len="med"/>
+                      <a:tailEnd type="none" w="med" len="med"/>
+                    </a:lnR>
+                    <a:lnT w="12700" cap="flat" cmpd="sng" algn="ctr">
+                      <a:noFill/>
+                      <a:prstDash val="solid"/>
+                      <a:round/>
+                      <a:headEnd type="none" w="med" len="med"/>
+                      <a:tailEnd type="none" w="med" len="med"/>
+                    </a:lnT>
+                    <a:lnB w="12700" cap="flat" cmpd="sng" algn="ctr">
+                      <a:solidFill>
+                        <a:schemeClr val="tx1"/>
+                      </a:solidFill>
+                      <a:prstDash val="solid"/>
+                      <a:round/>
+                      <a:headEnd type="none" w="med" len="med"/>
+                      <a:tailEnd type="none" w="med" len="med"/>
+                    </a:lnB>
+                    <a:lnTlToBr w="12700" cmpd="sng">
+                      <a:noFill/>
+                      <a:prstDash val="solid"/>
+                    </a:lnTlToBr>
+                    <a:lnBlToTr w="12700" cmpd="sng">
+                      <a:noFill/>
+                      <a:prstDash val="solid"/>
+                    </a:lnBlToTr>
+                    <a:solidFill>
+                      <a:schemeClr val="bg1"/>
+                    </a:solidFill>
+                  </a:tcPr>
+                </a:tc>
+                <a:tc>
+                  <a:txBody>
+                    <a:bodyPr/>
+                    <a:lstStyle/>
+                    <a:p>
+                      <a:pPr algn="ctr"/>
+                      <a:r>
+                        <a:rPr lang="en-US" dirty="0">
+                          <a:solidFill>
+                            <a:schemeClr val="tx1"/>
+                          </a:solidFill>
+                        </a:rPr>
+                        <a:t>↓70min</a:t>
+                      </a:r>
+                    </a:p>
+                  </a:txBody>
+                  <a:tcPr>
+                    <a:lnL w="12700" cap="flat" cmpd="sng" algn="ctr">
+                      <a:solidFill>
+                        <a:schemeClr val="tx1"/>
+                      </a:solidFill>
+                      <a:prstDash val="solid"/>
+                      <a:round/>
+                      <a:headEnd type="none" w="med" len="med"/>
+                      <a:tailEnd type="none" w="med" len="med"/>
+                    </a:lnL>
+                    <a:lnR w="12700" cap="flat" cmpd="sng" algn="ctr">
+                      <a:solidFill>
+                        <a:schemeClr val="tx1"/>
+                      </a:solidFill>
+                      <a:prstDash val="solid"/>
+                      <a:round/>
+                      <a:headEnd type="none" w="med" len="med"/>
+                      <a:tailEnd type="none" w="med" len="med"/>
+                    </a:lnR>
+                    <a:lnT w="12700" cap="flat" cmpd="sng" algn="ctr">
+                      <a:noFill/>
+                      <a:prstDash val="solid"/>
+                      <a:round/>
+                      <a:headEnd type="none" w="med" len="med"/>
+                      <a:tailEnd type="none" w="med" len="med"/>
+                    </a:lnT>
+                    <a:lnB w="12700" cap="flat" cmpd="sng" algn="ctr">
+                      <a:solidFill>
+                        <a:schemeClr val="tx1"/>
+                      </a:solidFill>
+                      <a:prstDash val="solid"/>
+                      <a:round/>
+                      <a:headEnd type="none" w="med" len="med"/>
+                      <a:tailEnd type="none" w="med" len="med"/>
+                    </a:lnB>
+                    <a:lnTlToBr w="12700" cmpd="sng">
+                      <a:noFill/>
+                      <a:prstDash val="solid"/>
+                    </a:lnTlToBr>
+                    <a:lnBlToTr w="12700" cmpd="sng">
+                      <a:noFill/>
+                      <a:prstDash val="solid"/>
+                    </a:lnBlToTr>
+                    <a:solidFill>
+                      <a:schemeClr val="bg1"/>
+                    </a:solidFill>
+                  </a:tcPr>
+                </a:tc>
+                <a:tc>
+                  <a:txBody>
+                    <a:bodyPr/>
+                    <a:lstStyle/>
+                    <a:p>
+                      <a:pPr algn="ctr"/>
+                      <a:r>
+                        <a:rPr lang="en-US" b="1" dirty="0">
+                          <a:solidFill>
+                            <a:schemeClr val="tx1"/>
+                          </a:solidFill>
+                        </a:rPr>
+                        <a:t>↑</a:t>
+                      </a:r>
+                      <a:r>
+                        <a:rPr lang="en-US" dirty="0">
+                          <a:solidFill>
+                            <a:schemeClr val="tx1"/>
+                          </a:solidFill>
+                        </a:rPr>
+                        <a:t>70min</a:t>
+                      </a:r>
+                    </a:p>
+                  </a:txBody>
+                  <a:tcPr>
+                    <a:lnL w="12700" cap="flat" cmpd="sng" algn="ctr">
+                      <a:solidFill>
+                        <a:schemeClr val="tx1"/>
+                      </a:solidFill>
+                      <a:prstDash val="solid"/>
+                      <a:round/>
+                      <a:headEnd type="none" w="med" len="med"/>
+                      <a:tailEnd type="none" w="med" len="med"/>
+                    </a:lnL>
+                    <a:lnR w="12700" cap="flat" cmpd="sng" algn="ctr">
+                      <a:noFill/>
+                      <a:prstDash val="solid"/>
+                      <a:round/>
+                      <a:headEnd type="none" w="med" len="med"/>
+                      <a:tailEnd type="none" w="med" len="med"/>
+                    </a:lnR>
+                    <a:lnT w="12700" cap="flat" cmpd="sng" algn="ctr">
+                      <a:noFill/>
+                      <a:prstDash val="solid"/>
+                      <a:round/>
+                      <a:headEnd type="none" w="med" len="med"/>
+                      <a:tailEnd type="none" w="med" len="med"/>
+                    </a:lnT>
+                    <a:lnB w="12700" cap="flat" cmpd="sng" algn="ctr">
+                      <a:solidFill>
+                        <a:schemeClr val="tx1"/>
+                      </a:solidFill>
+                      <a:prstDash val="solid"/>
+                      <a:round/>
+                      <a:headEnd type="none" w="med" len="med"/>
+                      <a:tailEnd type="none" w="med" len="med"/>
+                    </a:lnB>
+                    <a:lnTlToBr w="12700" cmpd="sng">
+                      <a:noFill/>
+                      <a:prstDash val="solid"/>
+                    </a:lnTlToBr>
+                    <a:lnBlToTr w="12700" cmpd="sng">
+                      <a:noFill/>
+                      <a:prstDash val="solid"/>
+                    </a:lnBlToTr>
+                    <a:solidFill>
+                      <a:schemeClr val="bg1"/>
+                    </a:solidFill>
+                  </a:tcPr>
+                </a:tc>
+                <a:extLst>
+                  <a:ext uri="{0D108BD9-81ED-4DB2-BD59-A6C34878D82A}">
+                    <a16:rowId xmlns:a16="http://schemas.microsoft.com/office/drawing/2014/main" val="1378381846"/>
+                  </a:ext>
+                </a:extLst>
+              </a:tr>
+              <a:tr h="370840">
+                <a:tc>
+                  <a:txBody>
+                    <a:bodyPr/>
+                    <a:lstStyle/>
+                    <a:p>
+                      <a:pPr algn="ctr"/>
+                      <a:r>
+                        <a:rPr lang="en-US" b="1" dirty="0">
+                          <a:solidFill>
+                            <a:schemeClr val="tx1"/>
+                          </a:solidFill>
+                        </a:rPr>
+                        <a:t>↑25hr</a:t>
+                      </a:r>
+                    </a:p>
+                  </a:txBody>
+                  <a:tcPr>
+                    <a:lnL w="12700" cap="flat" cmpd="sng" algn="ctr">
+                      <a:noFill/>
+                      <a:prstDash val="solid"/>
+                      <a:round/>
+                      <a:headEnd type="none" w="med" len="med"/>
+                      <a:tailEnd type="none" w="med" len="med"/>
+                    </a:lnL>
+                    <a:lnR w="12700" cap="flat" cmpd="sng" algn="ctr">
+                      <a:solidFill>
+                        <a:schemeClr val="tx1"/>
+                      </a:solidFill>
+                      <a:prstDash val="solid"/>
+                      <a:round/>
+                      <a:headEnd type="none" w="med" len="med"/>
+                      <a:tailEnd type="none" w="med" len="med"/>
+                    </a:lnR>
+                    <a:lnT w="12700" cap="flat" cmpd="sng" algn="ctr">
+                      <a:solidFill>
+                        <a:schemeClr val="tx1"/>
+                      </a:solidFill>
+                      <a:prstDash val="solid"/>
+                      <a:round/>
+                      <a:headEnd type="none" w="med" len="med"/>
+                      <a:tailEnd type="none" w="med" len="med"/>
+                    </a:lnT>
+                    <a:lnB w="12700" cap="flat" cmpd="sng" algn="ctr">
+                      <a:solidFill>
+                        <a:schemeClr val="tx1"/>
+                      </a:solidFill>
+                      <a:prstDash val="solid"/>
+                      <a:round/>
+                      <a:headEnd type="none" w="med" len="med"/>
+                      <a:tailEnd type="none" w="med" len="med"/>
+                    </a:lnB>
+                    <a:lnTlToBr w="12700" cmpd="sng">
+                      <a:noFill/>
+                      <a:prstDash val="solid"/>
+                    </a:lnTlToBr>
+                    <a:lnBlToTr w="12700" cmpd="sng">
+                      <a:noFill/>
+                      <a:prstDash val="solid"/>
+                    </a:lnBlToTr>
+                    <a:solidFill>
+                      <a:schemeClr val="bg1"/>
+                    </a:solidFill>
+                  </a:tcPr>
+                </a:tc>
+                <a:tc>
+                  <a:txBody>
+                    <a:bodyPr/>
+                    <a:lstStyle/>
+                    <a:p>
+                      <a:pPr algn="ctr"/>
+                      <a:r>
+                        <a:rPr lang="en-US" dirty="0">
+                          <a:solidFill>
+                            <a:schemeClr val="tx1"/>
+                          </a:solidFill>
+                        </a:rPr>
+                        <a:t>9</a:t>
+                      </a:r>
+                    </a:p>
+                  </a:txBody>
+                  <a:tcPr>
+                    <a:lnL w="12700" cap="flat" cmpd="sng" algn="ctr">
+                      <a:solidFill>
+                        <a:schemeClr val="tx1"/>
+                      </a:solidFill>
+                      <a:prstDash val="solid"/>
+                      <a:round/>
+                      <a:headEnd type="none" w="med" len="med"/>
+                      <a:tailEnd type="none" w="med" len="med"/>
+                    </a:lnL>
+                    <a:lnR w="12700" cap="flat" cmpd="sng" algn="ctr">
+                      <a:solidFill>
+                        <a:schemeClr val="tx1"/>
+                      </a:solidFill>
+                      <a:prstDash val="solid"/>
+                      <a:round/>
+                      <a:headEnd type="none" w="med" len="med"/>
+                      <a:tailEnd type="none" w="med" len="med"/>
+                    </a:lnR>
+                    <a:lnT w="12700" cap="flat" cmpd="sng" algn="ctr">
+                      <a:solidFill>
+                        <a:schemeClr val="tx1"/>
+                      </a:solidFill>
+                      <a:prstDash val="solid"/>
+                      <a:round/>
+                      <a:headEnd type="none" w="med" len="med"/>
+                      <a:tailEnd type="none" w="med" len="med"/>
+                    </a:lnT>
+                    <a:lnB w="12700" cap="flat" cmpd="sng" algn="ctr">
+                      <a:solidFill>
+                        <a:schemeClr val="tx1"/>
+                      </a:solidFill>
+                      <a:prstDash val="solid"/>
+                      <a:round/>
+                      <a:headEnd type="none" w="med" len="med"/>
+                      <a:tailEnd type="none" w="med" len="med"/>
+                    </a:lnB>
+                    <a:lnTlToBr w="12700" cmpd="sng">
+                      <a:noFill/>
+                      <a:prstDash val="solid"/>
+                    </a:lnTlToBr>
+                    <a:lnBlToTr w="12700" cmpd="sng">
+                      <a:noFill/>
+                      <a:prstDash val="solid"/>
+                    </a:lnBlToTr>
+                    <a:solidFill>
+                      <a:schemeClr val="bg1"/>
+                    </a:solidFill>
+                  </a:tcPr>
+                </a:tc>
+                <a:tc>
+                  <a:txBody>
+                    <a:bodyPr/>
+                    <a:lstStyle/>
+                    <a:p>
+                      <a:pPr algn="ctr"/>
+                      <a:r>
+                        <a:rPr lang="en-US" dirty="0">
+                          <a:solidFill>
+                            <a:schemeClr val="tx1"/>
+                          </a:solidFill>
+                        </a:rPr>
+                        <a:t>4</a:t>
+                      </a:r>
+                    </a:p>
+                  </a:txBody>
+                  <a:tcPr>
+                    <a:lnL w="12700" cap="flat" cmpd="sng" algn="ctr">
+                      <a:solidFill>
+                        <a:schemeClr val="tx1"/>
+                      </a:solidFill>
+                      <a:prstDash val="solid"/>
+                      <a:round/>
+                      <a:headEnd type="none" w="med" len="med"/>
+                      <a:tailEnd type="none" w="med" len="med"/>
+                    </a:lnL>
+                    <a:lnR w="12700" cap="flat" cmpd="sng" algn="ctr">
+                      <a:noFill/>
+                      <a:prstDash val="solid"/>
+                      <a:round/>
+                      <a:headEnd type="none" w="med" len="med"/>
+                      <a:tailEnd type="none" w="med" len="med"/>
+                    </a:lnR>
+                    <a:lnT w="12700" cap="flat" cmpd="sng" algn="ctr">
+                      <a:solidFill>
+                        <a:schemeClr val="tx1"/>
+                      </a:solidFill>
+                      <a:prstDash val="solid"/>
+                      <a:round/>
+                      <a:headEnd type="none" w="med" len="med"/>
+                      <a:tailEnd type="none" w="med" len="med"/>
+                    </a:lnT>
+                    <a:lnB w="12700" cap="flat" cmpd="sng" algn="ctr">
+                      <a:solidFill>
+                        <a:schemeClr val="tx1"/>
+                      </a:solidFill>
+                      <a:prstDash val="solid"/>
+                      <a:round/>
+                      <a:headEnd type="none" w="med" len="med"/>
+                      <a:tailEnd type="none" w="med" len="med"/>
+                    </a:lnB>
+                    <a:lnTlToBr w="12700" cmpd="sng">
+                      <a:noFill/>
+                      <a:prstDash val="solid"/>
+                    </a:lnTlToBr>
+                    <a:lnBlToTr w="12700" cmpd="sng">
+                      <a:noFill/>
+                      <a:prstDash val="solid"/>
+                    </a:lnBlToTr>
+                    <a:solidFill>
+                      <a:schemeClr val="bg1"/>
+                    </a:solidFill>
+                  </a:tcPr>
+                </a:tc>
+                <a:extLst>
+                  <a:ext uri="{0D108BD9-81ED-4DB2-BD59-A6C34878D82A}">
+                    <a16:rowId xmlns:a16="http://schemas.microsoft.com/office/drawing/2014/main" val="2904357014"/>
+                  </a:ext>
+                </a:extLst>
+              </a:tr>
+              <a:tr h="370840">
+                <a:tc>
+                  <a:txBody>
+                    <a:bodyPr/>
+                    <a:lstStyle/>
+                    <a:p>
+                      <a:pPr algn="ctr"/>
+                      <a:r>
+                        <a:rPr lang="en-US" b="1" dirty="0">
+                          <a:solidFill>
+                            <a:schemeClr val="tx1"/>
+                          </a:solidFill>
+                        </a:rPr>
+                        <a:t>↓25hr</a:t>
+                      </a:r>
+                    </a:p>
+                  </a:txBody>
+                  <a:tcPr>
+                    <a:lnL w="12700" cap="flat" cmpd="sng" algn="ctr">
+                      <a:noFill/>
+                      <a:prstDash val="solid"/>
+                      <a:round/>
+                      <a:headEnd type="none" w="med" len="med"/>
+                      <a:tailEnd type="none" w="med" len="med"/>
+                    </a:lnL>
+                    <a:lnR w="12700" cap="flat" cmpd="sng" algn="ctr">
+                      <a:solidFill>
+                        <a:schemeClr val="tx1"/>
+                      </a:solidFill>
+                      <a:prstDash val="solid"/>
+                      <a:round/>
+                      <a:headEnd type="none" w="med" len="med"/>
+                      <a:tailEnd type="none" w="med" len="med"/>
+                    </a:lnR>
+                    <a:lnT w="12700" cap="flat" cmpd="sng" algn="ctr">
+                      <a:solidFill>
+                        <a:schemeClr val="tx1"/>
+                      </a:solidFill>
+                      <a:prstDash val="solid"/>
+                      <a:round/>
+                      <a:headEnd type="none" w="med" len="med"/>
+                      <a:tailEnd type="none" w="med" len="med"/>
+                    </a:lnT>
+                    <a:lnB w="12700" cap="flat" cmpd="sng" algn="ctr">
+                      <a:noFill/>
+                      <a:prstDash val="solid"/>
+                      <a:round/>
+                      <a:headEnd type="none" w="med" len="med"/>
+                      <a:tailEnd type="none" w="med" len="med"/>
+                    </a:lnB>
+                    <a:lnTlToBr w="12700" cmpd="sng">
+                      <a:noFill/>
+                      <a:prstDash val="solid"/>
+                    </a:lnTlToBr>
+                    <a:lnBlToTr w="12700" cmpd="sng">
+                      <a:noFill/>
+                      <a:prstDash val="solid"/>
+                    </a:lnBlToTr>
+                    <a:solidFill>
+                      <a:schemeClr val="bg1"/>
+                    </a:solidFill>
+                  </a:tcPr>
+                </a:tc>
+                <a:tc>
+                  <a:txBody>
+                    <a:bodyPr/>
+                    <a:lstStyle/>
+                    <a:p>
+                      <a:pPr algn="ctr"/>
+                      <a:r>
+                        <a:rPr lang="en-US" dirty="0">
+                          <a:solidFill>
+                            <a:schemeClr val="tx1"/>
+                          </a:solidFill>
+                        </a:rPr>
+                        <a:t>4</a:t>
+                      </a:r>
+                    </a:p>
+                  </a:txBody>
+                  <a:tcPr>
+                    <a:lnL w="12700" cap="flat" cmpd="sng" algn="ctr">
+                      <a:solidFill>
+                        <a:schemeClr val="tx1"/>
+                      </a:solidFill>
+                      <a:prstDash val="solid"/>
+                      <a:round/>
+                      <a:headEnd type="none" w="med" len="med"/>
+                      <a:tailEnd type="none" w="med" len="med"/>
+                    </a:lnL>
+                    <a:lnR w="12700" cap="flat" cmpd="sng" algn="ctr">
+                      <a:solidFill>
+                        <a:schemeClr val="tx1"/>
+                      </a:solidFill>
+                      <a:prstDash val="solid"/>
+                      <a:round/>
+                      <a:headEnd type="none" w="med" len="med"/>
+                      <a:tailEnd type="none" w="med" len="med"/>
+                    </a:lnR>
+                    <a:lnT w="12700" cap="flat" cmpd="sng" algn="ctr">
+                      <a:solidFill>
+                        <a:schemeClr val="tx1"/>
+                      </a:solidFill>
+                      <a:prstDash val="solid"/>
+                      <a:round/>
+                      <a:headEnd type="none" w="med" len="med"/>
+                      <a:tailEnd type="none" w="med" len="med"/>
+                    </a:lnT>
+                    <a:lnB w="12700" cap="flat" cmpd="sng" algn="ctr">
+                      <a:noFill/>
+                      <a:prstDash val="solid"/>
+                      <a:round/>
+                      <a:headEnd type="none" w="med" len="med"/>
+                      <a:tailEnd type="none" w="med" len="med"/>
+                    </a:lnB>
+                    <a:lnTlToBr w="12700" cmpd="sng">
+                      <a:noFill/>
+                      <a:prstDash val="solid"/>
+                    </a:lnTlToBr>
+                    <a:lnBlToTr w="12700" cmpd="sng">
+                      <a:noFill/>
+                      <a:prstDash val="solid"/>
+                    </a:lnBlToTr>
+                    <a:solidFill>
+                      <a:schemeClr val="bg1"/>
+                    </a:solidFill>
+                  </a:tcPr>
+                </a:tc>
+                <a:tc>
+                  <a:txBody>
+                    <a:bodyPr/>
+                    <a:lstStyle/>
+                    <a:p>
+                      <a:pPr algn="ctr"/>
+                      <a:r>
+                        <a:rPr lang="en-US" dirty="0">
+                          <a:solidFill>
+                            <a:schemeClr val="tx1"/>
+                          </a:solidFill>
+                        </a:rPr>
+                        <a:t>8</a:t>
+                      </a:r>
+                    </a:p>
+                  </a:txBody>
+                  <a:tcPr>
+                    <a:lnL w="12700" cap="flat" cmpd="sng" algn="ctr">
+                      <a:solidFill>
+                        <a:schemeClr val="tx1"/>
+                      </a:solidFill>
+                      <a:prstDash val="solid"/>
+                      <a:round/>
+                      <a:headEnd type="none" w="med" len="med"/>
+                      <a:tailEnd type="none" w="med" len="med"/>
+                    </a:lnL>
+                    <a:lnR w="12700" cap="flat" cmpd="sng" algn="ctr">
+                      <a:noFill/>
+                      <a:prstDash val="solid"/>
+                      <a:round/>
+                      <a:headEnd type="none" w="med" len="med"/>
+                      <a:tailEnd type="none" w="med" len="med"/>
+                    </a:lnR>
+                    <a:lnT w="12700" cap="flat" cmpd="sng" algn="ctr">
+                      <a:solidFill>
+                        <a:schemeClr val="tx1"/>
+                      </a:solidFill>
+                      <a:prstDash val="solid"/>
+                      <a:round/>
+                      <a:headEnd type="none" w="med" len="med"/>
+                      <a:tailEnd type="none" w="med" len="med"/>
+                    </a:lnT>
+                    <a:lnB w="12700" cap="flat" cmpd="sng" algn="ctr">
+                      <a:noFill/>
+                      <a:prstDash val="solid"/>
+                      <a:round/>
+                      <a:headEnd type="none" w="med" len="med"/>
+                      <a:tailEnd type="none" w="med" len="med"/>
+                    </a:lnB>
+                    <a:lnTlToBr w="12700" cmpd="sng">
+                      <a:noFill/>
+                      <a:prstDash val="solid"/>
+                    </a:lnTlToBr>
+                    <a:lnBlToTr w="12700" cmpd="sng">
+                      <a:noFill/>
+                      <a:prstDash val="solid"/>
+                    </a:lnBlToTr>
+                    <a:solidFill>
+                      <a:schemeClr val="bg1"/>
+                    </a:solidFill>
+                  </a:tcPr>
+                </a:tc>
+                <a:extLst>
+                  <a:ext uri="{0D108BD9-81ED-4DB2-BD59-A6C34878D82A}">
+                    <a16:rowId xmlns:a16="http://schemas.microsoft.com/office/drawing/2014/main" val="383195842"/>
+                  </a:ext>
+                </a:extLst>
+              </a:tr>
+            </a:tbl>
+          </a:graphicData>
+        </a:graphic>
+      </p:graphicFrame>
+      <p:graphicFrame>
+        <p:nvGraphicFramePr>
+          <p:cNvPr id="24" name="Table 23">
+            <a:extLst>
+              <a:ext uri="{FF2B5EF4-FFF2-40B4-BE49-F238E27FC236}">
+                <a16:creationId xmlns:a16="http://schemas.microsoft.com/office/drawing/2014/main" id="{AA9B2503-7971-4AB4-5318-2CA1498AA995}"/>
+              </a:ext>
+            </a:extLst>
+          </p:cNvPr>
+          <p:cNvGraphicFramePr>
+            <a:graphicFrameLocks noGrp="1"/>
+          </p:cNvGraphicFramePr>
+          <p:nvPr>
+            <p:extLst>
+              <p:ext uri="{D42A27DB-BD31-4B8C-83A1-F6EECF244321}">
+                <p14:modId xmlns:p14="http://schemas.microsoft.com/office/powerpoint/2010/main" val="968286675"/>
+              </p:ext>
+            </p:extLst>
+          </p:nvPr>
+        </p:nvGraphicFramePr>
+        <p:xfrm>
+          <a:off x="5791946" y="4246127"/>
+          <a:ext cx="3277785" cy="1179576"/>
+        </p:xfrm>
+        <a:graphic>
+          <a:graphicData uri="http://schemas.openxmlformats.org/drawingml/2006/table">
+            <a:tbl>
+              <a:tblPr firstRow="1" bandRow="1">
+                <a:tableStyleId>{5C22544A-7EE6-4342-B048-85BDC9FD1C3A}</a:tableStyleId>
+              </a:tblPr>
+              <a:tblGrid>
+                <a:gridCol w="1092595">
+                  <a:extLst>
+                    <a:ext uri="{9D8B030D-6E8A-4147-A177-3AD203B41FA5}">
+                      <a16:colId xmlns:a16="http://schemas.microsoft.com/office/drawing/2014/main" val="1032210984"/>
+                    </a:ext>
+                  </a:extLst>
+                </a:gridCol>
+                <a:gridCol w="1092595">
+                  <a:extLst>
+                    <a:ext uri="{9D8B030D-6E8A-4147-A177-3AD203B41FA5}">
+                      <a16:colId xmlns:a16="http://schemas.microsoft.com/office/drawing/2014/main" val="3050461674"/>
+                    </a:ext>
+                  </a:extLst>
+                </a:gridCol>
+                <a:gridCol w="1092595">
+                  <a:extLst>
+                    <a:ext uri="{9D8B030D-6E8A-4147-A177-3AD203B41FA5}">
+                      <a16:colId xmlns:a16="http://schemas.microsoft.com/office/drawing/2014/main" val="1708856229"/>
+                    </a:ext>
+                  </a:extLst>
+                </a:gridCol>
+              </a:tblGrid>
+              <a:tr h="370840">
+                <a:tc>
+                  <a:txBody>
+                    <a:bodyPr/>
+                    <a:lstStyle/>
+                    <a:p>
+                      <a:pPr algn="ctr"/>
+                      <a:endParaRPr lang="en-US" dirty="0">
+                        <a:solidFill>
+                          <a:schemeClr val="tx1"/>
+                        </a:solidFill>
+                      </a:endParaRPr>
+                    </a:p>
+                  </a:txBody>
+                  <a:tcPr>
+                    <a:lnL w="12700" cap="flat" cmpd="sng" algn="ctr">
+                      <a:noFill/>
+                      <a:prstDash val="solid"/>
+                      <a:round/>
+                      <a:headEnd type="none" w="med" len="med"/>
+                      <a:tailEnd type="none" w="med" len="med"/>
+                    </a:lnL>
+                    <a:lnR w="12700" cap="flat" cmpd="sng" algn="ctr">
+                      <a:solidFill>
+                        <a:schemeClr val="tx1"/>
+                      </a:solidFill>
+                      <a:prstDash val="solid"/>
+                      <a:round/>
+                      <a:headEnd type="none" w="med" len="med"/>
+                      <a:tailEnd type="none" w="med" len="med"/>
+                    </a:lnR>
+                    <a:lnT w="12700" cap="flat" cmpd="sng" algn="ctr">
+                      <a:noFill/>
+                      <a:prstDash val="solid"/>
+                      <a:round/>
+                      <a:headEnd type="none" w="med" len="med"/>
+                      <a:tailEnd type="none" w="med" len="med"/>
+                    </a:lnT>
+                    <a:lnB w="12700" cap="flat" cmpd="sng" algn="ctr">
+                      <a:solidFill>
+                        <a:schemeClr val="tx1"/>
+                      </a:solidFill>
+                      <a:prstDash val="solid"/>
+                      <a:round/>
+                      <a:headEnd type="none" w="med" len="med"/>
+                      <a:tailEnd type="none" w="med" len="med"/>
+                    </a:lnB>
+                    <a:lnTlToBr w="12700" cmpd="sng">
+                      <a:noFill/>
+                      <a:prstDash val="solid"/>
+                    </a:lnTlToBr>
+                    <a:lnBlToTr w="12700" cmpd="sng">
+                      <a:noFill/>
+                      <a:prstDash val="solid"/>
+                    </a:lnBlToTr>
+                    <a:solidFill>
+                      <a:schemeClr val="bg1"/>
+                    </a:solidFill>
+                  </a:tcPr>
+                </a:tc>
+                <a:tc>
+                  <a:txBody>
+                    <a:bodyPr/>
+                    <a:lstStyle/>
+                    <a:p>
+                      <a:pPr algn="ctr"/>
+                      <a:r>
+                        <a:rPr lang="en-US" dirty="0">
+                          <a:solidFill>
+                            <a:schemeClr val="tx1"/>
+                          </a:solidFill>
+                        </a:rPr>
+                        <a:t>↓70min</a:t>
+                      </a:r>
+                    </a:p>
+                  </a:txBody>
+                  <a:tcPr>
+                    <a:lnL w="12700" cap="flat" cmpd="sng" algn="ctr">
+                      <a:solidFill>
+                        <a:schemeClr val="tx1"/>
+                      </a:solidFill>
+                      <a:prstDash val="solid"/>
+                      <a:round/>
+                      <a:headEnd type="none" w="med" len="med"/>
+                      <a:tailEnd type="none" w="med" len="med"/>
+                    </a:lnL>
+                    <a:lnR w="12700" cap="flat" cmpd="sng" algn="ctr">
+                      <a:solidFill>
+                        <a:schemeClr val="tx1"/>
+                      </a:solidFill>
+                      <a:prstDash val="solid"/>
+                      <a:round/>
+                      <a:headEnd type="none" w="med" len="med"/>
+                      <a:tailEnd type="none" w="med" len="med"/>
+                    </a:lnR>
+                    <a:lnT w="12700" cap="flat" cmpd="sng" algn="ctr">
+                      <a:noFill/>
+                      <a:prstDash val="solid"/>
+                      <a:round/>
+                      <a:headEnd type="none" w="med" len="med"/>
+                      <a:tailEnd type="none" w="med" len="med"/>
+                    </a:lnT>
+                    <a:lnB w="12700" cap="flat" cmpd="sng" algn="ctr">
+                      <a:solidFill>
+                        <a:schemeClr val="tx1"/>
+                      </a:solidFill>
+                      <a:prstDash val="solid"/>
+                      <a:round/>
+                      <a:headEnd type="none" w="med" len="med"/>
+                      <a:tailEnd type="none" w="med" len="med"/>
+                    </a:lnB>
+                    <a:lnTlToBr w="12700" cmpd="sng">
+                      <a:noFill/>
+                      <a:prstDash val="solid"/>
+                    </a:lnTlToBr>
+                    <a:lnBlToTr w="12700" cmpd="sng">
+                      <a:noFill/>
+                      <a:prstDash val="solid"/>
+                    </a:lnBlToTr>
+                    <a:solidFill>
+                      <a:schemeClr val="bg1"/>
+                    </a:solidFill>
+                  </a:tcPr>
+                </a:tc>
+                <a:tc>
+                  <a:txBody>
+                    <a:bodyPr/>
+                    <a:lstStyle/>
+                    <a:p>
+                      <a:pPr algn="ctr"/>
+                      <a:r>
+                        <a:rPr lang="en-US" b="1" dirty="0">
+                          <a:solidFill>
+                            <a:schemeClr val="tx1"/>
+                          </a:solidFill>
+                        </a:rPr>
+                        <a:t>↑</a:t>
+                      </a:r>
+                      <a:r>
+                        <a:rPr lang="en-US" dirty="0">
+                          <a:solidFill>
+                            <a:schemeClr val="tx1"/>
+                          </a:solidFill>
+                        </a:rPr>
+                        <a:t>70min</a:t>
+                      </a:r>
+                    </a:p>
+                  </a:txBody>
+                  <a:tcPr>
+                    <a:lnL w="12700" cap="flat" cmpd="sng" algn="ctr">
+                      <a:solidFill>
+                        <a:schemeClr val="tx1"/>
+                      </a:solidFill>
+                      <a:prstDash val="solid"/>
+                      <a:round/>
+                      <a:headEnd type="none" w="med" len="med"/>
+                      <a:tailEnd type="none" w="med" len="med"/>
+                    </a:lnL>
+                    <a:lnR w="12700" cap="flat" cmpd="sng" algn="ctr">
+                      <a:noFill/>
+                      <a:prstDash val="solid"/>
+                      <a:round/>
+                      <a:headEnd type="none" w="med" len="med"/>
+                      <a:tailEnd type="none" w="med" len="med"/>
+                    </a:lnR>
+                    <a:lnT w="12700" cap="flat" cmpd="sng" algn="ctr">
+                      <a:noFill/>
+                      <a:prstDash val="solid"/>
+                      <a:round/>
+                      <a:headEnd type="none" w="med" len="med"/>
+                      <a:tailEnd type="none" w="med" len="med"/>
+                    </a:lnT>
+                    <a:lnB w="12700" cap="flat" cmpd="sng" algn="ctr">
+                      <a:solidFill>
+                        <a:schemeClr val="tx1"/>
+                      </a:solidFill>
+                      <a:prstDash val="solid"/>
+                      <a:round/>
+                      <a:headEnd type="none" w="med" len="med"/>
+                      <a:tailEnd type="none" w="med" len="med"/>
+                    </a:lnB>
+                    <a:lnTlToBr w="12700" cmpd="sng">
+                      <a:noFill/>
+                      <a:prstDash val="solid"/>
+                    </a:lnTlToBr>
+                    <a:lnBlToTr w="12700" cmpd="sng">
+                      <a:noFill/>
+                      <a:prstDash val="solid"/>
+                    </a:lnBlToTr>
+                    <a:solidFill>
+                      <a:schemeClr val="bg1"/>
+                    </a:solidFill>
+                  </a:tcPr>
+                </a:tc>
+                <a:extLst>
+                  <a:ext uri="{0D108BD9-81ED-4DB2-BD59-A6C34878D82A}">
+                    <a16:rowId xmlns:a16="http://schemas.microsoft.com/office/drawing/2014/main" val="1378381846"/>
+                  </a:ext>
+                </a:extLst>
+              </a:tr>
+              <a:tr h="370840">
+                <a:tc>
+                  <a:txBody>
+                    <a:bodyPr/>
+                    <a:lstStyle/>
+                    <a:p>
+                      <a:pPr algn="ctr"/>
+                      <a:r>
+                        <a:rPr lang="en-US" b="1" dirty="0">
+                          <a:solidFill>
+                            <a:schemeClr val="tx1"/>
+                          </a:solidFill>
+                        </a:rPr>
+                        <a:t>↑25hr</a:t>
+                      </a:r>
+                    </a:p>
+                  </a:txBody>
+                  <a:tcPr>
+                    <a:lnL w="12700" cap="flat" cmpd="sng" algn="ctr">
+                      <a:noFill/>
+                      <a:prstDash val="solid"/>
+                      <a:round/>
+                      <a:headEnd type="none" w="med" len="med"/>
+                      <a:tailEnd type="none" w="med" len="med"/>
+                    </a:lnL>
+                    <a:lnR w="12700" cap="flat" cmpd="sng" algn="ctr">
+                      <a:solidFill>
+                        <a:schemeClr val="tx1"/>
+                      </a:solidFill>
+                      <a:prstDash val="solid"/>
+                      <a:round/>
+                      <a:headEnd type="none" w="med" len="med"/>
+                      <a:tailEnd type="none" w="med" len="med"/>
+                    </a:lnR>
+                    <a:lnT w="12700" cap="flat" cmpd="sng" algn="ctr">
+                      <a:solidFill>
+                        <a:schemeClr val="tx1"/>
+                      </a:solidFill>
+                      <a:prstDash val="solid"/>
+                      <a:round/>
+                      <a:headEnd type="none" w="med" len="med"/>
+                      <a:tailEnd type="none" w="med" len="med"/>
+                    </a:lnT>
+                    <a:lnB w="12700" cap="flat" cmpd="sng" algn="ctr">
+                      <a:solidFill>
+                        <a:schemeClr val="tx1"/>
+                      </a:solidFill>
+                      <a:prstDash val="solid"/>
+                      <a:round/>
+                      <a:headEnd type="none" w="med" len="med"/>
+                      <a:tailEnd type="none" w="med" len="med"/>
+                    </a:lnB>
+                    <a:lnTlToBr w="12700" cmpd="sng">
+                      <a:noFill/>
+                      <a:prstDash val="solid"/>
+                    </a:lnTlToBr>
+                    <a:lnBlToTr w="12700" cmpd="sng">
+                      <a:noFill/>
+                      <a:prstDash val="solid"/>
+                    </a:lnBlToTr>
+                    <a:solidFill>
+                      <a:schemeClr val="bg1"/>
+                    </a:solidFill>
+                  </a:tcPr>
+                </a:tc>
+                <a:tc>
+                  <a:txBody>
+                    <a:bodyPr/>
+                    <a:lstStyle/>
+                    <a:p>
+                      <a:pPr algn="ctr"/>
+                      <a:r>
+                        <a:rPr lang="en-US" dirty="0">
+                          <a:solidFill>
+                            <a:schemeClr val="tx1"/>
+                          </a:solidFill>
+                        </a:rPr>
+                        <a:t>11</a:t>
+                      </a:r>
+                    </a:p>
+                  </a:txBody>
+                  <a:tcPr>
+                    <a:lnL w="12700" cap="flat" cmpd="sng" algn="ctr">
+                      <a:solidFill>
+                        <a:schemeClr val="tx1"/>
+                      </a:solidFill>
+                      <a:prstDash val="solid"/>
+                      <a:round/>
+                      <a:headEnd type="none" w="med" len="med"/>
+                      <a:tailEnd type="none" w="med" len="med"/>
+                    </a:lnL>
+                    <a:lnR w="12700" cap="flat" cmpd="sng" algn="ctr">
+                      <a:solidFill>
+                        <a:schemeClr val="tx1"/>
+                      </a:solidFill>
+                      <a:prstDash val="solid"/>
+                      <a:round/>
+                      <a:headEnd type="none" w="med" len="med"/>
+                      <a:tailEnd type="none" w="med" len="med"/>
+                    </a:lnR>
+                    <a:lnT w="12700" cap="flat" cmpd="sng" algn="ctr">
+                      <a:solidFill>
+                        <a:schemeClr val="tx1"/>
+                      </a:solidFill>
+                      <a:prstDash val="solid"/>
+                      <a:round/>
+                      <a:headEnd type="none" w="med" len="med"/>
+                      <a:tailEnd type="none" w="med" len="med"/>
+                    </a:lnT>
+                    <a:lnB w="12700" cap="flat" cmpd="sng" algn="ctr">
+                      <a:solidFill>
+                        <a:schemeClr val="tx1"/>
+                      </a:solidFill>
+                      <a:prstDash val="solid"/>
+                      <a:round/>
+                      <a:headEnd type="none" w="med" len="med"/>
+                      <a:tailEnd type="none" w="med" len="med"/>
+                    </a:lnB>
+                    <a:lnTlToBr w="12700" cmpd="sng">
+                      <a:noFill/>
+                      <a:prstDash val="solid"/>
+                    </a:lnTlToBr>
+                    <a:lnBlToTr w="12700" cmpd="sng">
+                      <a:noFill/>
+                      <a:prstDash val="solid"/>
+                    </a:lnBlToTr>
+                    <a:solidFill>
+                      <a:schemeClr val="bg1"/>
+                    </a:solidFill>
+                  </a:tcPr>
+                </a:tc>
+                <a:tc>
+                  <a:txBody>
+                    <a:bodyPr/>
+                    <a:lstStyle/>
+                    <a:p>
+                      <a:pPr algn="ctr"/>
+                      <a:r>
+                        <a:rPr lang="en-US" dirty="0">
+                          <a:solidFill>
+                            <a:schemeClr val="tx1"/>
+                          </a:solidFill>
+                        </a:rPr>
+                        <a:t>58</a:t>
+                      </a:r>
+                    </a:p>
+                  </a:txBody>
+                  <a:tcPr>
+                    <a:lnL w="12700" cap="flat" cmpd="sng" algn="ctr">
+                      <a:solidFill>
+                        <a:schemeClr val="tx1"/>
+                      </a:solidFill>
+                      <a:prstDash val="solid"/>
+                      <a:round/>
+                      <a:headEnd type="none" w="med" len="med"/>
+                      <a:tailEnd type="none" w="med" len="med"/>
+                    </a:lnL>
+                    <a:lnR w="12700" cap="flat" cmpd="sng" algn="ctr">
+                      <a:noFill/>
+                      <a:prstDash val="solid"/>
+                      <a:round/>
+                      <a:headEnd type="none" w="med" len="med"/>
+                      <a:tailEnd type="none" w="med" len="med"/>
+                    </a:lnR>
+                    <a:lnT w="12700" cap="flat" cmpd="sng" algn="ctr">
+                      <a:solidFill>
+                        <a:schemeClr val="tx1"/>
+                      </a:solidFill>
+                      <a:prstDash val="solid"/>
+                      <a:round/>
+                      <a:headEnd type="none" w="med" len="med"/>
+                      <a:tailEnd type="none" w="med" len="med"/>
+                    </a:lnT>
+                    <a:lnB w="12700" cap="flat" cmpd="sng" algn="ctr">
+                      <a:solidFill>
+                        <a:schemeClr val="tx1"/>
+                      </a:solidFill>
+                      <a:prstDash val="solid"/>
+                      <a:round/>
+                      <a:headEnd type="none" w="med" len="med"/>
+                      <a:tailEnd type="none" w="med" len="med"/>
+                    </a:lnB>
+                    <a:lnTlToBr w="12700" cmpd="sng">
+                      <a:noFill/>
+                      <a:prstDash val="solid"/>
+                    </a:lnTlToBr>
+                    <a:lnBlToTr w="12700" cmpd="sng">
+                      <a:noFill/>
+                      <a:prstDash val="solid"/>
+                    </a:lnBlToTr>
+                    <a:solidFill>
+                      <a:schemeClr val="bg1"/>
+                    </a:solidFill>
+                  </a:tcPr>
+                </a:tc>
+                <a:extLst>
+                  <a:ext uri="{0D108BD9-81ED-4DB2-BD59-A6C34878D82A}">
+                    <a16:rowId xmlns:a16="http://schemas.microsoft.com/office/drawing/2014/main" val="2904357014"/>
+                  </a:ext>
+                </a:extLst>
+              </a:tr>
+              <a:tr h="370840">
+                <a:tc>
+                  <a:txBody>
+                    <a:bodyPr/>
+                    <a:lstStyle/>
+                    <a:p>
+                      <a:pPr algn="ctr"/>
+                      <a:r>
+                        <a:rPr lang="en-US" b="1" dirty="0">
+                          <a:solidFill>
+                            <a:schemeClr val="tx1"/>
+                          </a:solidFill>
+                        </a:rPr>
+                        <a:t>↓25hr</a:t>
+                      </a:r>
+                    </a:p>
+                  </a:txBody>
+                  <a:tcPr>
+                    <a:lnL w="12700" cap="flat" cmpd="sng" algn="ctr">
+                      <a:noFill/>
+                      <a:prstDash val="solid"/>
+                      <a:round/>
+                      <a:headEnd type="none" w="med" len="med"/>
+                      <a:tailEnd type="none" w="med" len="med"/>
+                    </a:lnL>
+                    <a:lnR w="12700" cap="flat" cmpd="sng" algn="ctr">
+                      <a:solidFill>
+                        <a:schemeClr val="tx1"/>
+                      </a:solidFill>
+                      <a:prstDash val="solid"/>
+                      <a:round/>
+                      <a:headEnd type="none" w="med" len="med"/>
+                      <a:tailEnd type="none" w="med" len="med"/>
+                    </a:lnR>
+                    <a:lnT w="12700" cap="flat" cmpd="sng" algn="ctr">
+                      <a:solidFill>
+                        <a:schemeClr val="tx1"/>
+                      </a:solidFill>
+                      <a:prstDash val="solid"/>
+                      <a:round/>
+                      <a:headEnd type="none" w="med" len="med"/>
+                      <a:tailEnd type="none" w="med" len="med"/>
+                    </a:lnT>
+                    <a:lnB w="12700" cap="flat" cmpd="sng" algn="ctr">
+                      <a:noFill/>
+                      <a:prstDash val="solid"/>
+                      <a:round/>
+                      <a:headEnd type="none" w="med" len="med"/>
+                      <a:tailEnd type="none" w="med" len="med"/>
+                    </a:lnB>
+                    <a:lnTlToBr w="12700" cmpd="sng">
+                      <a:noFill/>
+                      <a:prstDash val="solid"/>
+                    </a:lnTlToBr>
+                    <a:lnBlToTr w="12700" cmpd="sng">
+                      <a:noFill/>
+                      <a:prstDash val="solid"/>
+                    </a:lnBlToTr>
+                    <a:solidFill>
+                      <a:schemeClr val="bg1"/>
+                    </a:solidFill>
+                  </a:tcPr>
+                </a:tc>
+                <a:tc>
+                  <a:txBody>
+                    <a:bodyPr/>
+                    <a:lstStyle/>
+                    <a:p>
+                      <a:pPr algn="ctr"/>
+                      <a:r>
+                        <a:rPr lang="en-US" dirty="0">
+                          <a:solidFill>
+                            <a:schemeClr val="tx1"/>
+                          </a:solidFill>
+                        </a:rPr>
+                        <a:t>65</a:t>
+                      </a:r>
+                    </a:p>
+                  </a:txBody>
+                  <a:tcPr>
+                    <a:lnL w="12700" cap="flat" cmpd="sng" algn="ctr">
+                      <a:solidFill>
+                        <a:schemeClr val="tx1"/>
+                      </a:solidFill>
+                      <a:prstDash val="solid"/>
+                      <a:round/>
+                      <a:headEnd type="none" w="med" len="med"/>
+                      <a:tailEnd type="none" w="med" len="med"/>
+                    </a:lnL>
+                    <a:lnR w="12700" cap="flat" cmpd="sng" algn="ctr">
+                      <a:solidFill>
+                        <a:schemeClr val="tx1"/>
+                      </a:solidFill>
+                      <a:prstDash val="solid"/>
+                      <a:round/>
+                      <a:headEnd type="none" w="med" len="med"/>
+                      <a:tailEnd type="none" w="med" len="med"/>
+                    </a:lnR>
+                    <a:lnT w="12700" cap="flat" cmpd="sng" algn="ctr">
+                      <a:solidFill>
+                        <a:schemeClr val="tx1"/>
+                      </a:solidFill>
+                      <a:prstDash val="solid"/>
+                      <a:round/>
+                      <a:headEnd type="none" w="med" len="med"/>
+                      <a:tailEnd type="none" w="med" len="med"/>
+                    </a:lnT>
+                    <a:lnB w="12700" cap="flat" cmpd="sng" algn="ctr">
+                      <a:noFill/>
+                      <a:prstDash val="solid"/>
+                      <a:round/>
+                      <a:headEnd type="none" w="med" len="med"/>
+                      <a:tailEnd type="none" w="med" len="med"/>
+                    </a:lnB>
+                    <a:lnTlToBr w="12700" cmpd="sng">
+                      <a:noFill/>
+                      <a:prstDash val="solid"/>
+                    </a:lnTlToBr>
+                    <a:lnBlToTr w="12700" cmpd="sng">
+                      <a:noFill/>
+                      <a:prstDash val="solid"/>
+                    </a:lnBlToTr>
+                    <a:solidFill>
+                      <a:schemeClr val="bg1"/>
+                    </a:solidFill>
+                  </a:tcPr>
+                </a:tc>
+                <a:tc>
+                  <a:txBody>
+                    <a:bodyPr/>
+                    <a:lstStyle/>
+                    <a:p>
+                      <a:pPr algn="ctr"/>
+                      <a:r>
+                        <a:rPr lang="en-US" dirty="0">
+                          <a:solidFill>
+                            <a:schemeClr val="tx1"/>
+                          </a:solidFill>
+                        </a:rPr>
+                        <a:t>18</a:t>
+                      </a:r>
+                    </a:p>
+                  </a:txBody>
+                  <a:tcPr>
+                    <a:lnL w="12700" cap="flat" cmpd="sng" algn="ctr">
+                      <a:solidFill>
+                        <a:schemeClr val="tx1"/>
+                      </a:solidFill>
+                      <a:prstDash val="solid"/>
+                      <a:round/>
+                      <a:headEnd type="none" w="med" len="med"/>
+                      <a:tailEnd type="none" w="med" len="med"/>
+                    </a:lnL>
+                    <a:lnR w="12700" cap="flat" cmpd="sng" algn="ctr">
+                      <a:noFill/>
+                      <a:prstDash val="solid"/>
+                      <a:round/>
+                      <a:headEnd type="none" w="med" len="med"/>
+                      <a:tailEnd type="none" w="med" len="med"/>
+                    </a:lnR>
+                    <a:lnT w="12700" cap="flat" cmpd="sng" algn="ctr">
+                      <a:solidFill>
+                        <a:schemeClr val="tx1"/>
+                      </a:solidFill>
+                      <a:prstDash val="solid"/>
+                      <a:round/>
+                      <a:headEnd type="none" w="med" len="med"/>
+                      <a:tailEnd type="none" w="med" len="med"/>
+                    </a:lnT>
+                    <a:lnB w="12700" cap="flat" cmpd="sng" algn="ctr">
+                      <a:noFill/>
+                      <a:prstDash val="solid"/>
+                      <a:round/>
+                      <a:headEnd type="none" w="med" len="med"/>
+                      <a:tailEnd type="none" w="med" len="med"/>
+                    </a:lnB>
+                    <a:lnTlToBr w="12700" cmpd="sng">
+                      <a:noFill/>
+                      <a:prstDash val="solid"/>
+                    </a:lnTlToBr>
+                    <a:lnBlToTr w="12700" cmpd="sng">
+                      <a:noFill/>
+                      <a:prstDash val="solid"/>
+                    </a:lnBlToTr>
+                    <a:solidFill>
+                      <a:schemeClr val="bg1"/>
+                    </a:solidFill>
+                  </a:tcPr>
+                </a:tc>
+                <a:extLst>
+                  <a:ext uri="{0D108BD9-81ED-4DB2-BD59-A6C34878D82A}">
+                    <a16:rowId xmlns:a16="http://schemas.microsoft.com/office/drawing/2014/main" val="383195842"/>
+                  </a:ext>
+                </a:extLst>
+              </a:tr>
+            </a:tbl>
+          </a:graphicData>
+        </a:graphic>
+      </p:graphicFrame>
+      <p:graphicFrame>
+        <p:nvGraphicFramePr>
+          <p:cNvPr id="25" name="Table 24">
+            <a:extLst>
+              <a:ext uri="{FF2B5EF4-FFF2-40B4-BE49-F238E27FC236}">
+                <a16:creationId xmlns:a16="http://schemas.microsoft.com/office/drawing/2014/main" id="{69ACB985-C4FC-9304-D045-CB92A3771F67}"/>
+              </a:ext>
+            </a:extLst>
+          </p:cNvPr>
+          <p:cNvGraphicFramePr>
+            <a:graphicFrameLocks noGrp="1"/>
+          </p:cNvGraphicFramePr>
+          <p:nvPr>
+            <p:extLst>
+              <p:ext uri="{D42A27DB-BD31-4B8C-83A1-F6EECF244321}">
+                <p14:modId xmlns:p14="http://schemas.microsoft.com/office/powerpoint/2010/main" val="211320303"/>
+              </p:ext>
+            </p:extLst>
+          </p:nvPr>
+        </p:nvGraphicFramePr>
+        <p:xfrm>
+          <a:off x="1003379" y="9676655"/>
+          <a:ext cx="3277785" cy="1179576"/>
+        </p:xfrm>
+        <a:graphic>
+          <a:graphicData uri="http://schemas.openxmlformats.org/drawingml/2006/table">
+            <a:tbl>
+              <a:tblPr firstRow="1" bandRow="1">
+                <a:tableStyleId>{5C22544A-7EE6-4342-B048-85BDC9FD1C3A}</a:tableStyleId>
+              </a:tblPr>
+              <a:tblGrid>
+                <a:gridCol w="1092595">
+                  <a:extLst>
+                    <a:ext uri="{9D8B030D-6E8A-4147-A177-3AD203B41FA5}">
+                      <a16:colId xmlns:a16="http://schemas.microsoft.com/office/drawing/2014/main" val="1032210984"/>
+                    </a:ext>
+                  </a:extLst>
+                </a:gridCol>
+                <a:gridCol w="1092595">
+                  <a:extLst>
+                    <a:ext uri="{9D8B030D-6E8A-4147-A177-3AD203B41FA5}">
+                      <a16:colId xmlns:a16="http://schemas.microsoft.com/office/drawing/2014/main" val="3050461674"/>
+                    </a:ext>
+                  </a:extLst>
+                </a:gridCol>
+                <a:gridCol w="1092595">
+                  <a:extLst>
+                    <a:ext uri="{9D8B030D-6E8A-4147-A177-3AD203B41FA5}">
+                      <a16:colId xmlns:a16="http://schemas.microsoft.com/office/drawing/2014/main" val="1708856229"/>
+                    </a:ext>
+                  </a:extLst>
+                </a:gridCol>
+              </a:tblGrid>
+              <a:tr h="370840">
+                <a:tc>
+                  <a:txBody>
+                    <a:bodyPr/>
+                    <a:lstStyle/>
+                    <a:p>
+                      <a:pPr algn="ctr"/>
+                      <a:endParaRPr lang="en-US" dirty="0">
+                        <a:solidFill>
+                          <a:schemeClr val="tx1"/>
+                        </a:solidFill>
+                      </a:endParaRPr>
+                    </a:p>
+                  </a:txBody>
+                  <a:tcPr>
+                    <a:lnL w="12700" cap="flat" cmpd="sng" algn="ctr">
+                      <a:noFill/>
+                      <a:prstDash val="solid"/>
+                      <a:round/>
+                      <a:headEnd type="none" w="med" len="med"/>
+                      <a:tailEnd type="none" w="med" len="med"/>
+                    </a:lnL>
+                    <a:lnR w="12700" cap="flat" cmpd="sng" algn="ctr">
+                      <a:solidFill>
+                        <a:schemeClr val="tx1"/>
+                      </a:solidFill>
+                      <a:prstDash val="solid"/>
+                      <a:round/>
+                      <a:headEnd type="none" w="med" len="med"/>
+                      <a:tailEnd type="none" w="med" len="med"/>
+                    </a:lnR>
+                    <a:lnT w="12700" cap="flat" cmpd="sng" algn="ctr">
+                      <a:noFill/>
+                      <a:prstDash val="solid"/>
+                      <a:round/>
+                      <a:headEnd type="none" w="med" len="med"/>
+                      <a:tailEnd type="none" w="med" len="med"/>
+                    </a:lnT>
+                    <a:lnB w="12700" cap="flat" cmpd="sng" algn="ctr">
+                      <a:solidFill>
+                        <a:schemeClr val="tx1"/>
+                      </a:solidFill>
+                      <a:prstDash val="solid"/>
+                      <a:round/>
+                      <a:headEnd type="none" w="med" len="med"/>
+                      <a:tailEnd type="none" w="med" len="med"/>
+                    </a:lnB>
+                    <a:lnTlToBr w="12700" cmpd="sng">
+                      <a:noFill/>
+                      <a:prstDash val="solid"/>
+                    </a:lnTlToBr>
+                    <a:lnBlToTr w="12700" cmpd="sng">
+                      <a:noFill/>
+                      <a:prstDash val="solid"/>
+                    </a:lnBlToTr>
+                    <a:solidFill>
+                      <a:schemeClr val="bg1"/>
+                    </a:solidFill>
+                  </a:tcPr>
+                </a:tc>
+                <a:tc>
+                  <a:txBody>
+                    <a:bodyPr/>
+                    <a:lstStyle/>
+                    <a:p>
+                      <a:pPr algn="ctr"/>
+                      <a:r>
+                        <a:rPr lang="en-US" dirty="0">
+                          <a:solidFill>
+                            <a:schemeClr val="tx1"/>
+                          </a:solidFill>
+                        </a:rPr>
+                        <a:t>↓70min</a:t>
+                      </a:r>
+                    </a:p>
+                  </a:txBody>
+                  <a:tcPr>
+                    <a:lnL w="12700" cap="flat" cmpd="sng" algn="ctr">
+                      <a:solidFill>
+                        <a:schemeClr val="tx1"/>
+                      </a:solidFill>
+                      <a:prstDash val="solid"/>
+                      <a:round/>
+                      <a:headEnd type="none" w="med" len="med"/>
+                      <a:tailEnd type="none" w="med" len="med"/>
+                    </a:lnL>
+                    <a:lnR w="12700" cap="flat" cmpd="sng" algn="ctr">
+                      <a:solidFill>
+                        <a:schemeClr val="tx1"/>
+                      </a:solidFill>
+                      <a:prstDash val="solid"/>
+                      <a:round/>
+                      <a:headEnd type="none" w="med" len="med"/>
+                      <a:tailEnd type="none" w="med" len="med"/>
+                    </a:lnR>
+                    <a:lnT w="12700" cap="flat" cmpd="sng" algn="ctr">
+                      <a:noFill/>
+                      <a:prstDash val="solid"/>
+                      <a:round/>
+                      <a:headEnd type="none" w="med" len="med"/>
+                      <a:tailEnd type="none" w="med" len="med"/>
+                    </a:lnT>
+                    <a:lnB w="12700" cap="flat" cmpd="sng" algn="ctr">
+                      <a:solidFill>
+                        <a:schemeClr val="tx1"/>
+                      </a:solidFill>
+                      <a:prstDash val="solid"/>
+                      <a:round/>
+                      <a:headEnd type="none" w="med" len="med"/>
+                      <a:tailEnd type="none" w="med" len="med"/>
+                    </a:lnB>
+                    <a:lnTlToBr w="12700" cmpd="sng">
+                      <a:noFill/>
+                      <a:prstDash val="solid"/>
+                    </a:lnTlToBr>
+                    <a:lnBlToTr w="12700" cmpd="sng">
+                      <a:noFill/>
+                      <a:prstDash val="solid"/>
+                    </a:lnBlToTr>
+                    <a:solidFill>
+                      <a:schemeClr val="bg1"/>
+                    </a:solidFill>
+                  </a:tcPr>
+                </a:tc>
+                <a:tc>
+                  <a:txBody>
+                    <a:bodyPr/>
+                    <a:lstStyle/>
+                    <a:p>
+                      <a:pPr algn="ctr"/>
+                      <a:r>
+                        <a:rPr lang="en-US" b="1" dirty="0">
+                          <a:solidFill>
+                            <a:schemeClr val="tx1"/>
+                          </a:solidFill>
+                        </a:rPr>
+                        <a:t>↑</a:t>
+                      </a:r>
+                      <a:r>
+                        <a:rPr lang="en-US" dirty="0">
+                          <a:solidFill>
+                            <a:schemeClr val="tx1"/>
+                          </a:solidFill>
+                        </a:rPr>
+                        <a:t>70min</a:t>
+                      </a:r>
+                    </a:p>
+                  </a:txBody>
+                  <a:tcPr>
+                    <a:lnL w="12700" cap="flat" cmpd="sng" algn="ctr">
+                      <a:solidFill>
+                        <a:schemeClr val="tx1"/>
+                      </a:solidFill>
+                      <a:prstDash val="solid"/>
+                      <a:round/>
+                      <a:headEnd type="none" w="med" len="med"/>
+                      <a:tailEnd type="none" w="med" len="med"/>
+                    </a:lnL>
+                    <a:lnR w="12700" cap="flat" cmpd="sng" algn="ctr">
+                      <a:noFill/>
+                      <a:prstDash val="solid"/>
+                      <a:round/>
+                      <a:headEnd type="none" w="med" len="med"/>
+                      <a:tailEnd type="none" w="med" len="med"/>
+                    </a:lnR>
+                    <a:lnT w="12700" cap="flat" cmpd="sng" algn="ctr">
+                      <a:noFill/>
+                      <a:prstDash val="solid"/>
+                      <a:round/>
+                      <a:headEnd type="none" w="med" len="med"/>
+                      <a:tailEnd type="none" w="med" len="med"/>
+                    </a:lnT>
+                    <a:lnB w="12700" cap="flat" cmpd="sng" algn="ctr">
+                      <a:solidFill>
+                        <a:schemeClr val="tx1"/>
+                      </a:solidFill>
+                      <a:prstDash val="solid"/>
+                      <a:round/>
+                      <a:headEnd type="none" w="med" len="med"/>
+                      <a:tailEnd type="none" w="med" len="med"/>
+                    </a:lnB>
+                    <a:lnTlToBr w="12700" cmpd="sng">
+                      <a:noFill/>
+                      <a:prstDash val="solid"/>
+                    </a:lnTlToBr>
+                    <a:lnBlToTr w="12700" cmpd="sng">
+                      <a:noFill/>
+                      <a:prstDash val="solid"/>
+                    </a:lnBlToTr>
+                    <a:solidFill>
+                      <a:schemeClr val="bg1"/>
+                    </a:solidFill>
+                  </a:tcPr>
+                </a:tc>
+                <a:extLst>
+                  <a:ext uri="{0D108BD9-81ED-4DB2-BD59-A6C34878D82A}">
+                    <a16:rowId xmlns:a16="http://schemas.microsoft.com/office/drawing/2014/main" val="1378381846"/>
+                  </a:ext>
+                </a:extLst>
+              </a:tr>
+              <a:tr h="370840">
+                <a:tc>
+                  <a:txBody>
+                    <a:bodyPr/>
+                    <a:lstStyle/>
+                    <a:p>
+                      <a:pPr algn="ctr"/>
+                      <a:r>
+                        <a:rPr lang="en-US" b="1" dirty="0">
+                          <a:solidFill>
+                            <a:schemeClr val="tx1"/>
+                          </a:solidFill>
+                        </a:rPr>
+                        <a:t>↑25hr</a:t>
+                      </a:r>
+                    </a:p>
+                  </a:txBody>
+                  <a:tcPr>
+                    <a:lnL w="12700" cap="flat" cmpd="sng" algn="ctr">
+                      <a:noFill/>
+                      <a:prstDash val="solid"/>
+                      <a:round/>
+                      <a:headEnd type="none" w="med" len="med"/>
+                      <a:tailEnd type="none" w="med" len="med"/>
+                    </a:lnL>
+                    <a:lnR w="12700" cap="flat" cmpd="sng" algn="ctr">
+                      <a:solidFill>
+                        <a:schemeClr val="tx1"/>
+                      </a:solidFill>
+                      <a:prstDash val="solid"/>
+                      <a:round/>
+                      <a:headEnd type="none" w="med" len="med"/>
+                      <a:tailEnd type="none" w="med" len="med"/>
+                    </a:lnR>
+                    <a:lnT w="12700" cap="flat" cmpd="sng" algn="ctr">
+                      <a:solidFill>
+                        <a:schemeClr val="tx1"/>
+                      </a:solidFill>
+                      <a:prstDash val="solid"/>
+                      <a:round/>
+                      <a:headEnd type="none" w="med" len="med"/>
+                      <a:tailEnd type="none" w="med" len="med"/>
+                    </a:lnT>
+                    <a:lnB w="12700" cap="flat" cmpd="sng" algn="ctr">
+                      <a:solidFill>
+                        <a:schemeClr val="tx1"/>
+                      </a:solidFill>
+                      <a:prstDash val="solid"/>
+                      <a:round/>
+                      <a:headEnd type="none" w="med" len="med"/>
+                      <a:tailEnd type="none" w="med" len="med"/>
+                    </a:lnB>
+                    <a:lnTlToBr w="12700" cmpd="sng">
+                      <a:noFill/>
+                      <a:prstDash val="solid"/>
+                    </a:lnTlToBr>
+                    <a:lnBlToTr w="12700" cmpd="sng">
+                      <a:noFill/>
+                      <a:prstDash val="solid"/>
+                    </a:lnBlToTr>
+                    <a:solidFill>
+                      <a:schemeClr val="bg1"/>
+                    </a:solidFill>
+                  </a:tcPr>
+                </a:tc>
+                <a:tc>
+                  <a:txBody>
+                    <a:bodyPr/>
+                    <a:lstStyle/>
+                    <a:p>
+                      <a:pPr algn="ctr"/>
+                      <a:r>
+                        <a:rPr lang="en-US" dirty="0">
+                          <a:solidFill>
+                            <a:schemeClr val="tx1"/>
+                          </a:solidFill>
+                        </a:rPr>
+                        <a:t>3</a:t>
+                      </a:r>
+                    </a:p>
+                  </a:txBody>
+                  <a:tcPr>
+                    <a:lnL w="12700" cap="flat" cmpd="sng" algn="ctr">
+                      <a:solidFill>
+                        <a:schemeClr val="tx1"/>
+                      </a:solidFill>
+                      <a:prstDash val="solid"/>
+                      <a:round/>
+                      <a:headEnd type="none" w="med" len="med"/>
+                      <a:tailEnd type="none" w="med" len="med"/>
+                    </a:lnL>
+                    <a:lnR w="12700" cap="flat" cmpd="sng" algn="ctr">
+                      <a:solidFill>
+                        <a:schemeClr val="tx1"/>
+                      </a:solidFill>
+                      <a:prstDash val="solid"/>
+                      <a:round/>
+                      <a:headEnd type="none" w="med" len="med"/>
+                      <a:tailEnd type="none" w="med" len="med"/>
+                    </a:lnR>
+                    <a:lnT w="12700" cap="flat" cmpd="sng" algn="ctr">
+                      <a:solidFill>
+                        <a:schemeClr val="tx1"/>
+                      </a:solidFill>
+                      <a:prstDash val="solid"/>
+                      <a:round/>
+                      <a:headEnd type="none" w="med" len="med"/>
+                      <a:tailEnd type="none" w="med" len="med"/>
+                    </a:lnT>
+                    <a:lnB w="12700" cap="flat" cmpd="sng" algn="ctr">
+                      <a:solidFill>
+                        <a:schemeClr val="tx1"/>
+                      </a:solidFill>
+                      <a:prstDash val="solid"/>
+                      <a:round/>
+                      <a:headEnd type="none" w="med" len="med"/>
+                      <a:tailEnd type="none" w="med" len="med"/>
+                    </a:lnB>
+                    <a:lnTlToBr w="12700" cmpd="sng">
+                      <a:noFill/>
+                      <a:prstDash val="solid"/>
+                    </a:lnTlToBr>
+                    <a:lnBlToTr w="12700" cmpd="sng">
+                      <a:noFill/>
+                      <a:prstDash val="solid"/>
+                    </a:lnBlToTr>
+                    <a:solidFill>
+                      <a:schemeClr val="bg1"/>
+                    </a:solidFill>
+                  </a:tcPr>
+                </a:tc>
+                <a:tc>
+                  <a:txBody>
+                    <a:bodyPr/>
+                    <a:lstStyle/>
+                    <a:p>
+                      <a:pPr algn="ctr"/>
+                      <a:r>
+                        <a:rPr lang="en-US" dirty="0">
+                          <a:solidFill>
+                            <a:schemeClr val="tx1"/>
+                          </a:solidFill>
+                        </a:rPr>
+                        <a:t>7</a:t>
+                      </a:r>
+                    </a:p>
+                  </a:txBody>
+                  <a:tcPr>
+                    <a:lnL w="12700" cap="flat" cmpd="sng" algn="ctr">
+                      <a:solidFill>
+                        <a:schemeClr val="tx1"/>
+                      </a:solidFill>
+                      <a:prstDash val="solid"/>
+                      <a:round/>
+                      <a:headEnd type="none" w="med" len="med"/>
+                      <a:tailEnd type="none" w="med" len="med"/>
+                    </a:lnL>
+                    <a:lnR w="12700" cap="flat" cmpd="sng" algn="ctr">
+                      <a:noFill/>
+                      <a:prstDash val="solid"/>
+                      <a:round/>
+                      <a:headEnd type="none" w="med" len="med"/>
+                      <a:tailEnd type="none" w="med" len="med"/>
+                    </a:lnR>
+                    <a:lnT w="12700" cap="flat" cmpd="sng" algn="ctr">
+                      <a:solidFill>
+                        <a:schemeClr val="tx1"/>
+                      </a:solidFill>
+                      <a:prstDash val="solid"/>
+                      <a:round/>
+                      <a:headEnd type="none" w="med" len="med"/>
+                      <a:tailEnd type="none" w="med" len="med"/>
+                    </a:lnT>
+                    <a:lnB w="12700" cap="flat" cmpd="sng" algn="ctr">
+                      <a:solidFill>
+                        <a:schemeClr val="tx1"/>
+                      </a:solidFill>
+                      <a:prstDash val="solid"/>
+                      <a:round/>
+                      <a:headEnd type="none" w="med" len="med"/>
+                      <a:tailEnd type="none" w="med" len="med"/>
+                    </a:lnB>
+                    <a:lnTlToBr w="12700" cmpd="sng">
+                      <a:noFill/>
+                      <a:prstDash val="solid"/>
+                    </a:lnTlToBr>
+                    <a:lnBlToTr w="12700" cmpd="sng">
+                      <a:noFill/>
+                      <a:prstDash val="solid"/>
+                    </a:lnBlToTr>
+                    <a:solidFill>
+                      <a:schemeClr val="bg1"/>
+                    </a:solidFill>
+                  </a:tcPr>
+                </a:tc>
+                <a:extLst>
+                  <a:ext uri="{0D108BD9-81ED-4DB2-BD59-A6C34878D82A}">
+                    <a16:rowId xmlns:a16="http://schemas.microsoft.com/office/drawing/2014/main" val="2904357014"/>
+                  </a:ext>
+                </a:extLst>
+              </a:tr>
+              <a:tr h="370840">
+                <a:tc>
+                  <a:txBody>
+                    <a:bodyPr/>
+                    <a:lstStyle/>
+                    <a:p>
+                      <a:pPr algn="ctr"/>
+                      <a:r>
+                        <a:rPr lang="en-US" b="1" dirty="0">
+                          <a:solidFill>
+                            <a:schemeClr val="tx1"/>
+                          </a:solidFill>
+                        </a:rPr>
+                        <a:t>↓25hr</a:t>
+                      </a:r>
+                    </a:p>
+                  </a:txBody>
+                  <a:tcPr>
+                    <a:lnL w="12700" cap="flat" cmpd="sng" algn="ctr">
+                      <a:noFill/>
+                      <a:prstDash val="solid"/>
+                      <a:round/>
+                      <a:headEnd type="none" w="med" len="med"/>
+                      <a:tailEnd type="none" w="med" len="med"/>
+                    </a:lnL>
+                    <a:lnR w="12700" cap="flat" cmpd="sng" algn="ctr">
+                      <a:solidFill>
+                        <a:schemeClr val="tx1"/>
+                      </a:solidFill>
+                      <a:prstDash val="solid"/>
+                      <a:round/>
+                      <a:headEnd type="none" w="med" len="med"/>
+                      <a:tailEnd type="none" w="med" len="med"/>
+                    </a:lnR>
+                    <a:lnT w="12700" cap="flat" cmpd="sng" algn="ctr">
+                      <a:solidFill>
+                        <a:schemeClr val="tx1"/>
+                      </a:solidFill>
+                      <a:prstDash val="solid"/>
+                      <a:round/>
+                      <a:headEnd type="none" w="med" len="med"/>
+                      <a:tailEnd type="none" w="med" len="med"/>
+                    </a:lnT>
+                    <a:lnB w="12700" cap="flat" cmpd="sng" algn="ctr">
+                      <a:noFill/>
+                      <a:prstDash val="solid"/>
+                      <a:round/>
+                      <a:headEnd type="none" w="med" len="med"/>
+                      <a:tailEnd type="none" w="med" len="med"/>
+                    </a:lnB>
+                    <a:lnTlToBr w="12700" cmpd="sng">
+                      <a:noFill/>
+                      <a:prstDash val="solid"/>
+                    </a:lnTlToBr>
+                    <a:lnBlToTr w="12700" cmpd="sng">
+                      <a:noFill/>
+                      <a:prstDash val="solid"/>
+                    </a:lnBlToTr>
+                    <a:solidFill>
+                      <a:schemeClr val="bg1"/>
+                    </a:solidFill>
+                  </a:tcPr>
+                </a:tc>
+                <a:tc>
+                  <a:txBody>
+                    <a:bodyPr/>
+                    <a:lstStyle/>
+                    <a:p>
+                      <a:pPr algn="ctr"/>
+                      <a:r>
+                        <a:rPr lang="en-US">
+                          <a:solidFill>
+                            <a:schemeClr val="tx1"/>
+                          </a:solidFill>
+                        </a:rPr>
+                        <a:t>1</a:t>
+                      </a:r>
+                      <a:r>
+                        <a:rPr lang="en-US" dirty="0">
+                          <a:solidFill>
+                            <a:schemeClr val="tx1"/>
+                          </a:solidFill>
+                        </a:rPr>
+                        <a:t>1</a:t>
+                      </a:r>
+                    </a:p>
+                  </a:txBody>
+                  <a:tcPr>
+                    <a:lnL w="12700" cap="flat" cmpd="sng" algn="ctr">
+                      <a:solidFill>
+                        <a:schemeClr val="tx1"/>
+                      </a:solidFill>
+                      <a:prstDash val="solid"/>
+                      <a:round/>
+                      <a:headEnd type="none" w="med" len="med"/>
+                      <a:tailEnd type="none" w="med" len="med"/>
+                    </a:lnL>
+                    <a:lnR w="12700" cap="flat" cmpd="sng" algn="ctr">
+                      <a:solidFill>
+                        <a:schemeClr val="tx1"/>
+                      </a:solidFill>
+                      <a:prstDash val="solid"/>
+                      <a:round/>
+                      <a:headEnd type="none" w="med" len="med"/>
+                      <a:tailEnd type="none" w="med" len="med"/>
+                    </a:lnR>
+                    <a:lnT w="12700" cap="flat" cmpd="sng" algn="ctr">
+                      <a:solidFill>
+                        <a:schemeClr val="tx1"/>
+                      </a:solidFill>
+                      <a:prstDash val="solid"/>
+                      <a:round/>
+                      <a:headEnd type="none" w="med" len="med"/>
+                      <a:tailEnd type="none" w="med" len="med"/>
+                    </a:lnT>
+                    <a:lnB w="12700" cap="flat" cmpd="sng" algn="ctr">
+                      <a:noFill/>
+                      <a:prstDash val="solid"/>
+                      <a:round/>
+                      <a:headEnd type="none" w="med" len="med"/>
+                      <a:tailEnd type="none" w="med" len="med"/>
+                    </a:lnB>
+                    <a:lnTlToBr w="12700" cmpd="sng">
+                      <a:noFill/>
+                      <a:prstDash val="solid"/>
+                    </a:lnTlToBr>
+                    <a:lnBlToTr w="12700" cmpd="sng">
+                      <a:noFill/>
+                      <a:prstDash val="solid"/>
+                    </a:lnBlToTr>
+                    <a:solidFill>
+                      <a:schemeClr val="bg1"/>
+                    </a:solidFill>
+                  </a:tcPr>
+                </a:tc>
+                <a:tc>
+                  <a:txBody>
+                    <a:bodyPr/>
+                    <a:lstStyle/>
+                    <a:p>
+                      <a:pPr algn="ctr"/>
+                      <a:r>
+                        <a:rPr lang="en-US" dirty="0">
+                          <a:solidFill>
+                            <a:schemeClr val="tx1"/>
+                          </a:solidFill>
+                        </a:rPr>
+                        <a:t>5</a:t>
+                      </a:r>
+                    </a:p>
+                  </a:txBody>
+                  <a:tcPr>
+                    <a:lnL w="12700" cap="flat" cmpd="sng" algn="ctr">
+                      <a:solidFill>
+                        <a:schemeClr val="tx1"/>
+                      </a:solidFill>
+                      <a:prstDash val="solid"/>
+                      <a:round/>
+                      <a:headEnd type="none" w="med" len="med"/>
+                      <a:tailEnd type="none" w="med" len="med"/>
+                    </a:lnL>
+                    <a:lnR w="12700" cap="flat" cmpd="sng" algn="ctr">
+                      <a:noFill/>
+                      <a:prstDash val="solid"/>
+                      <a:round/>
+                      <a:headEnd type="none" w="med" len="med"/>
+                      <a:tailEnd type="none" w="med" len="med"/>
+                    </a:lnR>
+                    <a:lnT w="12700" cap="flat" cmpd="sng" algn="ctr">
+                      <a:solidFill>
+                        <a:schemeClr val="tx1"/>
+                      </a:solidFill>
+                      <a:prstDash val="solid"/>
+                      <a:round/>
+                      <a:headEnd type="none" w="med" len="med"/>
+                      <a:tailEnd type="none" w="med" len="med"/>
+                    </a:lnT>
+                    <a:lnB w="12700" cap="flat" cmpd="sng" algn="ctr">
+                      <a:noFill/>
+                      <a:prstDash val="solid"/>
+                      <a:round/>
+                      <a:headEnd type="none" w="med" len="med"/>
+                      <a:tailEnd type="none" w="med" len="med"/>
+                    </a:lnB>
+                    <a:lnTlToBr w="12700" cmpd="sng">
+                      <a:noFill/>
+                      <a:prstDash val="solid"/>
+                    </a:lnTlToBr>
+                    <a:lnBlToTr w="12700" cmpd="sng">
+                      <a:noFill/>
+                      <a:prstDash val="solid"/>
+                    </a:lnBlToTr>
+                    <a:solidFill>
+                      <a:schemeClr val="bg1"/>
+                    </a:solidFill>
+                  </a:tcPr>
+                </a:tc>
+                <a:extLst>
+                  <a:ext uri="{0D108BD9-81ED-4DB2-BD59-A6C34878D82A}">
+                    <a16:rowId xmlns:a16="http://schemas.microsoft.com/office/drawing/2014/main" val="383195842"/>
+                  </a:ext>
+                </a:extLst>
+              </a:tr>
+            </a:tbl>
+          </a:graphicData>
+        </a:graphic>
+      </p:graphicFrame>
+      <p:sp>
+        <p:nvSpPr>
+          <p:cNvPr id="2" name="AutoShape 2">
+            <a:extLst>
+              <a:ext uri="{FF2B5EF4-FFF2-40B4-BE49-F238E27FC236}">
+                <a16:creationId xmlns:a16="http://schemas.microsoft.com/office/drawing/2014/main" id="{A97E2330-BC3D-953A-1F52-FFDE05D8A982}"/>
+              </a:ext>
+            </a:extLst>
+          </p:cNvPr>
+          <p:cNvSpPr>
+            <a:spLocks noChangeAspect="1" noChangeArrowheads="1"/>
+          </p:cNvSpPr>
+          <p:nvPr/>
+        </p:nvSpPr>
+        <p:spPr bwMode="auto">
+          <a:xfrm>
+            <a:off x="4876800" y="5334000"/>
+            <a:ext cx="304800" cy="304800"/>
+          </a:xfrm>
+          <a:prstGeom prst="rect">
+            <a:avLst/>
+          </a:prstGeom>
+          <a:noFill/>
+          <a:extLst>
+            <a:ext uri="{909E8E84-426E-40DD-AFC4-6F175D3DCCD1}">
+              <a14:hiddenFill xmlns:a14="http://schemas.microsoft.com/office/drawing/2010/main">
+                <a:solidFill>
+                  <a:srgbClr val="FFFFFF"/>
+                </a:solidFill>
+              </a14:hiddenFill>
+            </a:ext>
+          </a:extLst>
+        </p:spPr>
+        <p:txBody>
+          <a:bodyPr vert="horz" wrap="square" lIns="91440" tIns="45720" rIns="91440" bIns="45720" numCol="1" anchor="t" anchorCtr="0" compatLnSpc="1">
+            <a:prstTxWarp prst="textNoShape">
+              <a:avLst/>
+            </a:prstTxWarp>
+          </a:bodyPr>
+          <a:lstStyle/>
+          <a:p>
+            <a:endParaRPr lang="en-US"/>
+          </a:p>
+        </p:txBody>
+      </p:sp>
+    </p:spTree>
+    <p:extLst>
+      <p:ext uri="{BB962C8B-B14F-4D97-AF65-F5344CB8AC3E}">
+        <p14:creationId xmlns:p14="http://schemas.microsoft.com/office/powerpoint/2010/main" val="139090159"/>
       </p:ext>
     </p:extLst>
   </p:cSld>

</xml_diff>